<commit_message>
A bit more animating and sprucing up.
</commit_message>
<xml_diff>
--- a/ModelTalk.pptx
+++ b/ModelTalk.pptx
@@ -9011,7 +9011,12 @@
             <p:ph type="title"/>
           </p:nvPr>
         </p:nvSpPr>
-        <p:spPr/>
+        <p:spPr>
+          <a:xfrm>
+            <a:off x="457200" y="152400"/>
+            <a:ext cx="8229600" cy="1143000"/>
+          </a:xfrm>
+        </p:spPr>
         <p:txBody>
           <a:bodyPr/>
           <a:lstStyle/>
@@ -9876,6 +9881,82 @@
           </a:p>
         </p:txBody>
       </p:sp>
+      <p:sp>
+        <p:nvSpPr>
+          <p:cNvPr id="6" name="Cloud Callout 5"/>
+          <p:cNvSpPr/>
+          <p:nvPr/>
+        </p:nvSpPr>
+        <p:spPr>
+          <a:xfrm>
+            <a:off x="216092" y="220980"/>
+            <a:ext cx="1500565" cy="838200"/>
+          </a:xfrm>
+          <a:prstGeom prst="cloudCallout">
+            <a:avLst>
+              <a:gd name="adj1" fmla="val 27917"/>
+              <a:gd name="adj2" fmla="val 99318"/>
+            </a:avLst>
+          </a:prstGeom>
+          <a:solidFill>
+            <a:schemeClr val="accent1">
+              <a:lumMod val="20000"/>
+              <a:lumOff val="80000"/>
+            </a:schemeClr>
+          </a:solidFill>
+          <a:ln>
+            <a:solidFill>
+              <a:schemeClr val="tx2">
+                <a:lumMod val="75000"/>
+              </a:schemeClr>
+            </a:solidFill>
+          </a:ln>
+        </p:spPr>
+        <p:style>
+          <a:lnRef idx="2">
+            <a:schemeClr val="accent1">
+              <a:shade val="50000"/>
+            </a:schemeClr>
+          </a:lnRef>
+          <a:fillRef idx="1">
+            <a:schemeClr val="accent1"/>
+          </a:fillRef>
+          <a:effectRef idx="0">
+            <a:schemeClr val="accent1"/>
+          </a:effectRef>
+          <a:fontRef idx="minor">
+            <a:schemeClr val="lt1"/>
+          </a:fontRef>
+        </p:style>
+        <p:txBody>
+          <a:bodyPr rtlCol="0" anchor="ctr"/>
+          <a:lstStyle/>
+          <a:p>
+            <a:pPr algn="ctr"/>
+            <a:r>
+              <a:rPr lang="en-US" sz="2800" dirty="0">
+                <a:solidFill>
+                  <a:schemeClr val="tx1"/>
+                </a:solidFill>
+              </a:rPr>
+              <a:t>God</a:t>
+            </a:r>
+            <a:r>
+              <a:rPr lang="en-US" sz="2800" dirty="0" smtClean="0">
+                <a:solidFill>
+                  <a:schemeClr val="tx1"/>
+                </a:solidFill>
+              </a:rPr>
+              <a:t>?</a:t>
+            </a:r>
+            <a:endParaRPr lang="en-US" sz="2800" dirty="0">
+              <a:solidFill>
+                <a:schemeClr val="tx1"/>
+              </a:solidFill>
+            </a:endParaRPr>
+          </a:p>
+        </p:txBody>
+      </p:sp>
     </p:spTree>
     <p:extLst>
       <p:ext uri="{BB962C8B-B14F-4D97-AF65-F5344CB8AC3E}">
@@ -9920,7 +10001,7 @@
                                           </p:stCondLst>
                                         </p:cTn>
                                         <p:tgtEl>
-                                          <p:spTgt spid="4"/>
+                                          <p:spTgt spid="6"/>
                                         </p:tgtEl>
                                         <p:attrNameLst>
                                           <p:attrName>style.visibility</p:attrName>
@@ -9934,6 +10015,132 @@
                                       <p:cBhvr>
                                         <p:cTn id="7" dur="500"/>
                                         <p:tgtEl>
+                                          <p:spTgt spid="6"/>
+                                        </p:tgtEl>
+                                      </p:cBhvr>
+                                    </p:animEffect>
+                                  </p:childTnLst>
+                                </p:cTn>
+                              </p:par>
+                            </p:childTnLst>
+                          </p:cTn>
+                        </p:par>
+                      </p:childTnLst>
+                    </p:cTn>
+                  </p:par>
+                  <p:par>
+                    <p:cTn id="8" fill="hold">
+                      <p:stCondLst>
+                        <p:cond delay="indefinite"/>
+                      </p:stCondLst>
+                      <p:childTnLst>
+                        <p:par>
+                          <p:cTn id="9" fill="hold">
+                            <p:stCondLst>
+                              <p:cond delay="0"/>
+                            </p:stCondLst>
+                            <p:childTnLst>
+                              <p:par>
+                                <p:cTn id="10" presetID="2" presetClass="exit" presetSubtype="9" fill="hold" grpId="1" nodeType="clickEffect">
+                                  <p:stCondLst>
+                                    <p:cond delay="0"/>
+                                  </p:stCondLst>
+                                  <p:childTnLst>
+                                    <p:anim calcmode="lin" valueType="num">
+                                      <p:cBhvr additive="base">
+                                        <p:cTn id="11" dur="500"/>
+                                        <p:tgtEl>
+                                          <p:spTgt spid="6"/>
+                                        </p:tgtEl>
+                                        <p:attrNameLst>
+                                          <p:attrName>ppt_x</p:attrName>
+                                        </p:attrNameLst>
+                                      </p:cBhvr>
+                                      <p:tavLst>
+                                        <p:tav tm="0">
+                                          <p:val>
+                                            <p:strVal val="ppt_x"/>
+                                          </p:val>
+                                        </p:tav>
+                                        <p:tav tm="100000">
+                                          <p:val>
+                                            <p:strVal val="0-ppt_w/2"/>
+                                          </p:val>
+                                        </p:tav>
+                                      </p:tavLst>
+                                    </p:anim>
+                                    <p:anim calcmode="lin" valueType="num">
+                                      <p:cBhvr additive="base">
+                                        <p:cTn id="12" dur="500"/>
+                                        <p:tgtEl>
+                                          <p:spTgt spid="6"/>
+                                        </p:tgtEl>
+                                        <p:attrNameLst>
+                                          <p:attrName>ppt_y</p:attrName>
+                                        </p:attrNameLst>
+                                      </p:cBhvr>
+                                      <p:tavLst>
+                                        <p:tav tm="0">
+                                          <p:val>
+                                            <p:strVal val="ppt_y"/>
+                                          </p:val>
+                                        </p:tav>
+                                        <p:tav tm="100000">
+                                          <p:val>
+                                            <p:strVal val="0-ppt_h/2"/>
+                                          </p:val>
+                                        </p:tav>
+                                      </p:tavLst>
+                                    </p:anim>
+                                    <p:set>
+                                      <p:cBhvr>
+                                        <p:cTn id="13" dur="1" fill="hold">
+                                          <p:stCondLst>
+                                            <p:cond delay="499"/>
+                                          </p:stCondLst>
+                                        </p:cTn>
+                                        <p:tgtEl>
+                                          <p:spTgt spid="6"/>
+                                        </p:tgtEl>
+                                        <p:attrNameLst>
+                                          <p:attrName>style.visibility</p:attrName>
+                                        </p:attrNameLst>
+                                      </p:cBhvr>
+                                      <p:to>
+                                        <p:strVal val="hidden"/>
+                                      </p:to>
+                                    </p:set>
+                                  </p:childTnLst>
+                                </p:cTn>
+                              </p:par>
+                              <p:par>
+                                <p:cTn id="14" presetID="10" presetClass="entr" presetSubtype="0" fill="hold" grpId="0" nodeType="withEffect">
+                                  <p:stCondLst>
+                                    <p:cond delay="0"/>
+                                  </p:stCondLst>
+                                  <p:childTnLst>
+                                    <p:set>
+                                      <p:cBhvr>
+                                        <p:cTn id="15" dur="1" fill="hold">
+                                          <p:stCondLst>
+                                            <p:cond delay="0"/>
+                                          </p:stCondLst>
+                                        </p:cTn>
+                                        <p:tgtEl>
+                                          <p:spTgt spid="4"/>
+                                        </p:tgtEl>
+                                        <p:attrNameLst>
+                                          <p:attrName>style.visibility</p:attrName>
+                                        </p:attrNameLst>
+                                      </p:cBhvr>
+                                      <p:to>
+                                        <p:strVal val="visible"/>
+                                      </p:to>
+                                    </p:set>
+                                    <p:animEffect transition="in" filter="fade">
+                                      <p:cBhvr>
+                                        <p:cTn id="16" dur="500"/>
+                                        <p:tgtEl>
                                           <p:spTgt spid="4"/>
                                         </p:tgtEl>
                                       </p:cBhvr>
@@ -9942,14 +10149,14 @@
                                 </p:cTn>
                               </p:par>
                               <p:par>
-                                <p:cTn id="8" presetID="10" presetClass="entr" presetSubtype="0" fill="hold" nodeType="withEffect">
+                                <p:cTn id="17" presetID="10" presetClass="entr" presetSubtype="0" fill="hold" nodeType="withEffect">
                                   <p:stCondLst>
                                     <p:cond delay="0"/>
                                   </p:stCondLst>
                                   <p:childTnLst>
                                     <p:set>
                                       <p:cBhvr>
-                                        <p:cTn id="9" dur="1" fill="hold">
+                                        <p:cTn id="18" dur="1" fill="hold">
                                           <p:stCondLst>
                                             <p:cond delay="0"/>
                                           </p:stCondLst>
@@ -9971,7 +10178,7 @@
                                     </p:set>
                                     <p:animEffect transition="in" filter="fade">
                                       <p:cBhvr>
-                                        <p:cTn id="10" dur="500"/>
+                                        <p:cTn id="19" dur="500"/>
                                         <p:tgtEl>
                                           <p:spTgt spid="4">
                                             <p:txEl>
@@ -9991,26 +10198,26 @@
                     </p:cTn>
                   </p:par>
                   <p:par>
-                    <p:cTn id="11" fill="hold">
+                    <p:cTn id="20" fill="hold">
                       <p:stCondLst>
                         <p:cond delay="indefinite"/>
                       </p:stCondLst>
                       <p:childTnLst>
                         <p:par>
-                          <p:cTn id="12" fill="hold">
+                          <p:cTn id="21" fill="hold">
                             <p:stCondLst>
                               <p:cond delay="0"/>
                             </p:stCondLst>
                             <p:childTnLst>
                               <p:par>
-                                <p:cTn id="13" presetID="1" presetClass="entr" presetSubtype="0" fill="hold" nodeType="clickEffect">
+                                <p:cTn id="22" presetID="1" presetClass="entr" presetSubtype="0" fill="hold" nodeType="clickEffect">
                                   <p:stCondLst>
                                     <p:cond delay="0"/>
                                   </p:stCondLst>
                                   <p:childTnLst>
                                     <p:set>
                                       <p:cBhvr>
-                                        <p:cTn id="14" dur="1" fill="hold">
+                                        <p:cTn id="23" dur="1" fill="hold">
                                           <p:stCondLst>
                                             <p:cond delay="0"/>
                                           </p:stCondLst>
@@ -10040,26 +10247,26 @@
                     </p:cTn>
                   </p:par>
                   <p:par>
-                    <p:cTn id="15" fill="hold">
+                    <p:cTn id="24" fill="hold">
                       <p:stCondLst>
                         <p:cond delay="indefinite"/>
                       </p:stCondLst>
                       <p:childTnLst>
                         <p:par>
-                          <p:cTn id="16" fill="hold">
+                          <p:cTn id="25" fill="hold">
                             <p:stCondLst>
                               <p:cond delay="0"/>
                             </p:stCondLst>
                             <p:childTnLst>
                               <p:par>
-                                <p:cTn id="17" presetID="14" presetClass="entr" presetSubtype="10" fill="hold" grpId="0" nodeType="clickEffect">
+                                <p:cTn id="26" presetID="14" presetClass="entr" presetSubtype="10" fill="hold" grpId="0" nodeType="clickEffect">
                                   <p:stCondLst>
                                     <p:cond delay="0"/>
                                   </p:stCondLst>
                                   <p:childTnLst>
                                     <p:set>
                                       <p:cBhvr>
-                                        <p:cTn id="18" dur="1" fill="hold">
+                                        <p:cTn id="27" dur="1" fill="hold">
                                           <p:stCondLst>
                                             <p:cond delay="0"/>
                                           </p:stCondLst>
@@ -10077,7 +10284,7 @@
                                     </p:set>
                                     <p:animEffect transition="in" filter="randombar(horizontal)">
                                       <p:cBhvr>
-                                        <p:cTn id="19" dur="500"/>
+                                        <p:cTn id="28" dur="500"/>
                                         <p:tgtEl>
                                           <p:spTgt spid="5"/>
                                         </p:tgtEl>
@@ -10087,14 +10294,14 @@
                                 </p:cTn>
                               </p:par>
                               <p:par>
-                                <p:cTn id="20" presetID="10" presetClass="entr" presetSubtype="0" fill="hold" grpId="0" nodeType="withEffect">
+                                <p:cTn id="29" presetID="10" presetClass="entr" presetSubtype="0" fill="hold" grpId="0" nodeType="withEffect">
                                   <p:stCondLst>
                                     <p:cond delay="0"/>
                                   </p:stCondLst>
                                   <p:childTnLst>
                                     <p:set>
                                       <p:cBhvr>
-                                        <p:cTn id="21" dur="1" fill="hold">
+                                        <p:cTn id="30" dur="1" fill="hold">
                                           <p:stCondLst>
                                             <p:cond delay="0"/>
                                           </p:stCondLst>
@@ -10112,7 +10319,7 @@
                                     </p:set>
                                     <p:animEffect transition="in" filter="fade">
                                       <p:cBhvr>
-                                        <p:cTn id="22" dur="500"/>
+                                        <p:cTn id="31" dur="500"/>
                                         <p:tgtEl>
                                           <p:spTgt spid="9"/>
                                         </p:tgtEl>
@@ -10128,26 +10335,26 @@
                     </p:cTn>
                   </p:par>
                   <p:par>
-                    <p:cTn id="23" fill="hold">
+                    <p:cTn id="32" fill="hold">
                       <p:stCondLst>
                         <p:cond delay="indefinite"/>
                       </p:stCondLst>
                       <p:childTnLst>
                         <p:par>
-                          <p:cTn id="24" fill="hold">
+                          <p:cTn id="33" fill="hold">
                             <p:stCondLst>
                               <p:cond delay="0"/>
                             </p:stCondLst>
                             <p:childTnLst>
                               <p:par>
-                                <p:cTn id="25" presetID="10" presetClass="entr" presetSubtype="0" fill="hold" grpId="0" nodeType="clickEffect">
+                                <p:cTn id="34" presetID="10" presetClass="entr" presetSubtype="0" fill="hold" grpId="0" nodeType="clickEffect">
                                   <p:stCondLst>
                                     <p:cond delay="0"/>
                                   </p:stCondLst>
                                   <p:childTnLst>
                                     <p:set>
                                       <p:cBhvr>
-                                        <p:cTn id="26" dur="1" fill="hold">
+                                        <p:cTn id="35" dur="1" fill="hold">
                                           <p:stCondLst>
                                             <p:cond delay="0"/>
                                           </p:stCondLst>
@@ -10165,7 +10372,7 @@
                                     </p:set>
                                     <p:animEffect transition="in" filter="fade">
                                       <p:cBhvr>
-                                        <p:cTn id="27" dur="500"/>
+                                        <p:cTn id="36" dur="500"/>
                                         <p:tgtEl>
                                           <p:spTgt spid="14"/>
                                         </p:tgtEl>
@@ -10175,14 +10382,14 @@
                                 </p:cTn>
                               </p:par>
                               <p:par>
-                                <p:cTn id="28" presetID="10" presetClass="entr" presetSubtype="0" fill="hold" nodeType="withEffect">
+                                <p:cTn id="37" presetID="10" presetClass="entr" presetSubtype="0" fill="hold" nodeType="withEffect">
                                   <p:stCondLst>
                                     <p:cond delay="0"/>
                                   </p:stCondLst>
                                   <p:childTnLst>
                                     <p:set>
                                       <p:cBhvr>
-                                        <p:cTn id="29" dur="1" fill="hold">
+                                        <p:cTn id="38" dur="1" fill="hold">
                                           <p:stCondLst>
                                             <p:cond delay="0"/>
                                           </p:stCondLst>
@@ -10200,7 +10407,7 @@
                                     </p:set>
                                     <p:animEffect transition="in" filter="fade">
                                       <p:cBhvr>
-                                        <p:cTn id="30" dur="500"/>
+                                        <p:cTn id="39" dur="500"/>
                                         <p:tgtEl>
                                           <p:spTgt spid="15"/>
                                         </p:tgtEl>
@@ -10210,14 +10417,14 @@
                                 </p:cTn>
                               </p:par>
                               <p:par>
-                                <p:cTn id="31" presetID="10" presetClass="entr" presetSubtype="0" fill="hold" grpId="0" nodeType="withEffect">
+                                <p:cTn id="40" presetID="10" presetClass="entr" presetSubtype="0" fill="hold" grpId="0" nodeType="withEffect">
                                   <p:stCondLst>
                                     <p:cond delay="0"/>
                                   </p:stCondLst>
                                   <p:childTnLst>
                                     <p:set>
                                       <p:cBhvr>
-                                        <p:cTn id="32" dur="1" fill="hold">
+                                        <p:cTn id="41" dur="1" fill="hold">
                                           <p:stCondLst>
                                             <p:cond delay="0"/>
                                           </p:stCondLst>
@@ -10235,7 +10442,7 @@
                                     </p:set>
                                     <p:animEffect transition="in" filter="fade">
                                       <p:cBhvr>
-                                        <p:cTn id="33" dur="500"/>
+                                        <p:cTn id="42" dur="500"/>
                                         <p:tgtEl>
                                           <p:spTgt spid="31"/>
                                         </p:tgtEl>
@@ -10251,26 +10458,26 @@
                     </p:cTn>
                   </p:par>
                   <p:par>
-                    <p:cTn id="34" fill="hold">
+                    <p:cTn id="43" fill="hold">
                       <p:stCondLst>
                         <p:cond delay="indefinite"/>
                       </p:stCondLst>
                       <p:childTnLst>
                         <p:par>
-                          <p:cTn id="35" fill="hold">
+                          <p:cTn id="44" fill="hold">
                             <p:stCondLst>
                               <p:cond delay="0"/>
                             </p:stCondLst>
                             <p:childTnLst>
                               <p:par>
-                                <p:cTn id="36" presetID="10" presetClass="entr" presetSubtype="0" fill="hold" grpId="0" nodeType="clickEffect">
+                                <p:cTn id="45" presetID="10" presetClass="entr" presetSubtype="0" fill="hold" grpId="0" nodeType="clickEffect">
                                   <p:stCondLst>
                                     <p:cond delay="0"/>
                                   </p:stCondLst>
                                   <p:childTnLst>
                                     <p:set>
                                       <p:cBhvr>
-                                        <p:cTn id="37" dur="1" fill="hold">
+                                        <p:cTn id="46" dur="1" fill="hold">
                                           <p:stCondLst>
                                             <p:cond delay="0"/>
                                           </p:stCondLst>
@@ -10288,7 +10495,7 @@
                                     </p:set>
                                     <p:animEffect transition="in" filter="fade">
                                       <p:cBhvr>
-                                        <p:cTn id="38" dur="500"/>
+                                        <p:cTn id="47" dur="500"/>
                                         <p:tgtEl>
                                           <p:spTgt spid="10"/>
                                         </p:tgtEl>
@@ -10298,14 +10505,14 @@
                                 </p:cTn>
                               </p:par>
                               <p:par>
-                                <p:cTn id="39" presetID="10" presetClass="entr" presetSubtype="0" fill="hold" nodeType="withEffect">
+                                <p:cTn id="48" presetID="10" presetClass="entr" presetSubtype="0" fill="hold" nodeType="withEffect">
                                   <p:stCondLst>
                                     <p:cond delay="0"/>
                                   </p:stCondLst>
                                   <p:childTnLst>
                                     <p:set>
                                       <p:cBhvr>
-                                        <p:cTn id="40" dur="1" fill="hold">
+                                        <p:cTn id="49" dur="1" fill="hold">
                                           <p:stCondLst>
                                             <p:cond delay="0"/>
                                           </p:stCondLst>
@@ -10323,7 +10530,7 @@
                                     </p:set>
                                     <p:animEffect transition="in" filter="fade">
                                       <p:cBhvr>
-                                        <p:cTn id="41" dur="500"/>
+                                        <p:cTn id="50" dur="500"/>
                                         <p:tgtEl>
                                           <p:spTgt spid="20"/>
                                         </p:tgtEl>
@@ -10333,14 +10540,14 @@
                                 </p:cTn>
                               </p:par>
                               <p:par>
-                                <p:cTn id="42" presetID="10" presetClass="entr" presetSubtype="0" fill="hold" nodeType="withEffect">
+                                <p:cTn id="51" presetID="10" presetClass="entr" presetSubtype="0" fill="hold" nodeType="withEffect">
                                   <p:stCondLst>
                                     <p:cond delay="0"/>
                                   </p:stCondLst>
                                   <p:childTnLst>
                                     <p:set>
                                       <p:cBhvr>
-                                        <p:cTn id="43" dur="1" fill="hold">
+                                        <p:cTn id="52" dur="1" fill="hold">
                                           <p:stCondLst>
                                             <p:cond delay="0"/>
                                           </p:stCondLst>
@@ -10358,7 +10565,7 @@
                                     </p:set>
                                     <p:animEffect transition="in" filter="fade">
                                       <p:cBhvr>
-                                        <p:cTn id="44" dur="500"/>
+                                        <p:cTn id="53" dur="500"/>
                                         <p:tgtEl>
                                           <p:spTgt spid="30"/>
                                         </p:tgtEl>
@@ -10368,14 +10575,14 @@
                                 </p:cTn>
                               </p:par>
                               <p:par>
-                                <p:cTn id="45" presetID="10" presetClass="exit" presetSubtype="0" fill="hold" grpId="1" nodeType="withEffect">
+                                <p:cTn id="54" presetID="10" presetClass="exit" presetSubtype="0" fill="hold" grpId="1" nodeType="withEffect">
                                   <p:stCondLst>
                                     <p:cond delay="0"/>
                                   </p:stCondLst>
                                   <p:childTnLst>
                                     <p:animEffect transition="out" filter="fade">
                                       <p:cBhvr>
-                                        <p:cTn id="46" dur="500"/>
+                                        <p:cTn id="55" dur="500"/>
                                         <p:tgtEl>
                                           <p:spTgt spid="31"/>
                                         </p:tgtEl>
@@ -10383,7 +10590,7 @@
                                     </p:animEffect>
                                     <p:set>
                                       <p:cBhvr>
-                                        <p:cTn id="47" dur="1" fill="hold">
+                                        <p:cTn id="56" dur="1" fill="hold">
                                           <p:stCondLst>
                                             <p:cond delay="499"/>
                                           </p:stCondLst>
@@ -10409,26 +10616,26 @@
                     </p:cTn>
                   </p:par>
                   <p:par>
-                    <p:cTn id="48" fill="hold">
+                    <p:cTn id="57" fill="hold">
                       <p:stCondLst>
                         <p:cond delay="indefinite"/>
                       </p:stCondLst>
                       <p:childTnLst>
                         <p:par>
-                          <p:cTn id="49" fill="hold">
+                          <p:cTn id="58" fill="hold">
                             <p:stCondLst>
                               <p:cond delay="0"/>
                             </p:stCondLst>
                             <p:childTnLst>
                               <p:par>
-                                <p:cTn id="50" presetID="10" presetClass="entr" presetSubtype="0" fill="hold" grpId="2" nodeType="clickEffect">
+                                <p:cTn id="59" presetID="10" presetClass="entr" presetSubtype="0" fill="hold" grpId="2" nodeType="clickEffect">
                                   <p:stCondLst>
                                     <p:cond delay="0"/>
                                   </p:stCondLst>
                                   <p:childTnLst>
                                     <p:set>
                                       <p:cBhvr>
-                                        <p:cTn id="51" dur="1" fill="hold">
+                                        <p:cTn id="60" dur="1" fill="hold">
                                           <p:stCondLst>
                                             <p:cond delay="0"/>
                                           </p:stCondLst>
@@ -10446,7 +10653,7 @@
                                     </p:set>
                                     <p:animEffect transition="in" filter="fade">
                                       <p:cBhvr>
-                                        <p:cTn id="52" dur="500"/>
+                                        <p:cTn id="61" dur="500"/>
                                         <p:tgtEl>
                                           <p:spTgt spid="31"/>
                                         </p:tgtEl>
@@ -10459,20 +10666,20 @@
                           </p:cTn>
                         </p:par>
                         <p:par>
-                          <p:cTn id="53" fill="hold">
+                          <p:cTn id="62" fill="hold">
                             <p:stCondLst>
                               <p:cond delay="500"/>
                             </p:stCondLst>
                             <p:childTnLst>
                               <p:par>
-                                <p:cTn id="54" presetID="26" presetClass="emph" presetSubtype="0" repeatCount="4000" fill="hold" grpId="3" nodeType="afterEffect">
+                                <p:cTn id="63" presetID="26" presetClass="emph" presetSubtype="0" repeatCount="4000" fill="hold" grpId="3" nodeType="afterEffect">
                                   <p:stCondLst>
                                     <p:cond delay="0"/>
                                   </p:stCondLst>
                                   <p:childTnLst>
                                     <p:animEffect transition="out" filter="fade">
                                       <p:cBhvr>
-                                        <p:cTn id="55" dur="1000" tmFilter="0, 0; .2, .5; .8, .5; 1, 0"/>
+                                        <p:cTn id="64" dur="1000" tmFilter="0, 0; .2, .5; .8, .5; 1, 0"/>
                                         <p:tgtEl>
                                           <p:spTgt spid="31"/>
                                         </p:tgtEl>
@@ -10480,7 +10687,7 @@
                                     </p:animEffect>
                                     <p:animScale>
                                       <p:cBhvr>
-                                        <p:cTn id="56" dur="500" autoRev="1" fill="hold"/>
+                                        <p:cTn id="65" dur="500" autoRev="1" fill="hold"/>
                                         <p:tgtEl>
                                           <p:spTgt spid="31"/>
                                         </p:tgtEl>
@@ -10491,14 +10698,14 @@
                                 </p:cTn>
                               </p:par>
                               <p:par>
-                                <p:cTn id="57" presetID="8" presetClass="emph" presetSubtype="0" repeatCount="2000" fill="hold" nodeType="withEffect">
+                                <p:cTn id="66" presetID="8" presetClass="emph" presetSubtype="0" repeatCount="2000" fill="hold" nodeType="withEffect">
                                   <p:stCondLst>
                                     <p:cond delay="0"/>
                                   </p:stCondLst>
                                   <p:childTnLst>
                                     <p:animRot by="21600000">
                                       <p:cBhvr>
-                                        <p:cTn id="58" dur="2000" fill="hold"/>
+                                        <p:cTn id="67" dur="2000" fill="hold"/>
                                         <p:tgtEl>
                                           <p:spTgt spid="30"/>
                                         </p:tgtEl>
@@ -10517,26 +10724,26 @@
                     </p:cTn>
                   </p:par>
                   <p:par>
-                    <p:cTn id="59" fill="hold">
+                    <p:cTn id="68" fill="hold">
                       <p:stCondLst>
                         <p:cond delay="indefinite"/>
                       </p:stCondLst>
                       <p:childTnLst>
                         <p:par>
-                          <p:cTn id="60" fill="hold">
+                          <p:cTn id="69" fill="hold">
                             <p:stCondLst>
                               <p:cond delay="0"/>
                             </p:stCondLst>
                             <p:childTnLst>
                               <p:par>
-                                <p:cTn id="61" presetID="2" presetClass="entr" presetSubtype="12" fill="hold" nodeType="clickEffect">
+                                <p:cTn id="70" presetID="2" presetClass="entr" presetSubtype="12" fill="hold" nodeType="clickEffect">
                                   <p:stCondLst>
                                     <p:cond delay="0"/>
                                   </p:stCondLst>
                                   <p:childTnLst>
                                     <p:set>
                                       <p:cBhvr>
-                                        <p:cTn id="62" dur="1" fill="hold">
+                                        <p:cTn id="71" dur="1" fill="hold">
                                           <p:stCondLst>
                                             <p:cond delay="0"/>
                                           </p:stCondLst>
@@ -10554,7 +10761,7 @@
                                     </p:set>
                                     <p:anim calcmode="lin" valueType="num">
                                       <p:cBhvr additive="base">
-                                        <p:cTn id="63" dur="500" fill="hold"/>
+                                        <p:cTn id="72" dur="500" fill="hold"/>
                                         <p:tgtEl>
                                           <p:spTgt spid="39"/>
                                         </p:tgtEl>
@@ -10577,7 +10784,7 @@
                                     </p:anim>
                                     <p:anim calcmode="lin" valueType="num">
                                       <p:cBhvr additive="base">
-                                        <p:cTn id="64" dur="500" fill="hold"/>
+                                        <p:cTn id="73" dur="500" fill="hold"/>
                                         <p:tgtEl>
                                           <p:spTgt spid="39"/>
                                         </p:tgtEl>
@@ -10602,14 +10809,14 @@
                                 </p:cTn>
                               </p:par>
                               <p:par>
-                                <p:cTn id="65" presetID="2" presetClass="entr" presetSubtype="12" fill="hold" grpId="0" nodeType="withEffect">
+                                <p:cTn id="74" presetID="2" presetClass="entr" presetSubtype="12" fill="hold" grpId="0" nodeType="withEffect">
                                   <p:stCondLst>
                                     <p:cond delay="0"/>
                                   </p:stCondLst>
                                   <p:childTnLst>
                                     <p:set>
                                       <p:cBhvr>
-                                        <p:cTn id="66" dur="1" fill="hold">
+                                        <p:cTn id="75" dur="1" fill="hold">
                                           <p:stCondLst>
                                             <p:cond delay="0"/>
                                           </p:stCondLst>
@@ -10627,7 +10834,7 @@
                                     </p:set>
                                     <p:anim calcmode="lin" valueType="num">
                                       <p:cBhvr additive="base">
-                                        <p:cTn id="67" dur="500" fill="hold"/>
+                                        <p:cTn id="76" dur="500" fill="hold"/>
                                         <p:tgtEl>
                                           <p:spTgt spid="26"/>
                                         </p:tgtEl>
@@ -10650,7 +10857,7 @@
                                     </p:anim>
                                     <p:anim calcmode="lin" valueType="num">
                                       <p:cBhvr additive="base">
-                                        <p:cTn id="68" dur="500" fill="hold"/>
+                                        <p:cTn id="77" dur="500" fill="hold"/>
                                         <p:tgtEl>
                                           <p:spTgt spid="26"/>
                                         </p:tgtEl>
@@ -10712,6 +10919,8 @@
       <p:bldP spid="31" grpId="2" animBg="1"/>
       <p:bldP spid="31" grpId="3" animBg="1"/>
       <p:bldP spid="26" grpId="0" animBg="1"/>
+      <p:bldP spid="6" grpId="0" animBg="1"/>
+      <p:bldP spid="6" grpId="1" animBg="1"/>
     </p:bldLst>
   </p:timing>
 </p:sld>

</xml_diff>

<commit_message>
Add in 3 hard limits
</commit_message>
<xml_diff>
--- a/ModelTalk.pptx
+++ b/ModelTalk.pptx
@@ -127,6 +127,3006 @@
 </p:presentation>
 </file>
 
+<file path=ppt/diagrams/colors1.xml><?xml version="1.0" encoding="utf-8"?>
+<dgm:colorsDef xmlns:dgm="http://schemas.openxmlformats.org/drawingml/2006/diagram" xmlns:a="http://schemas.openxmlformats.org/drawingml/2006/main" uniqueId="urn:microsoft.com/office/officeart/2005/8/colors/accent1_5">
+  <dgm:title val=""/>
+  <dgm:desc val=""/>
+  <dgm:catLst>
+    <dgm:cat type="accent1" pri="11500"/>
+  </dgm:catLst>
+  <dgm:styleLbl name="node0">
+    <dgm:fillClrLst meth="cycle">
+      <a:schemeClr val="accent1">
+        <a:alpha val="80000"/>
+      </a:schemeClr>
+    </dgm:fillClrLst>
+    <dgm:linClrLst meth="repeat">
+      <a:schemeClr val="lt1"/>
+    </dgm:linClrLst>
+    <dgm:effectClrLst/>
+    <dgm:txLinClrLst/>
+    <dgm:txFillClrLst/>
+    <dgm:txEffectClrLst/>
+  </dgm:styleLbl>
+  <dgm:styleLbl name="node1">
+    <dgm:fillClrLst>
+      <a:schemeClr val="accent1">
+        <a:alpha val="90000"/>
+      </a:schemeClr>
+      <a:schemeClr val="accent1">
+        <a:alpha val="50000"/>
+      </a:schemeClr>
+    </dgm:fillClrLst>
+    <dgm:linClrLst meth="repeat">
+      <a:schemeClr val="lt1"/>
+    </dgm:linClrLst>
+    <dgm:effectClrLst/>
+    <dgm:txLinClrLst/>
+    <dgm:txFillClrLst/>
+    <dgm:txEffectClrLst/>
+  </dgm:styleLbl>
+  <dgm:styleLbl name="alignNode1">
+    <dgm:fillClrLst>
+      <a:schemeClr val="accent1">
+        <a:alpha val="90000"/>
+      </a:schemeClr>
+      <a:schemeClr val="accent1">
+        <a:alpha val="50000"/>
+      </a:schemeClr>
+    </dgm:fillClrLst>
+    <dgm:linClrLst>
+      <a:schemeClr val="accent1">
+        <a:alpha val="90000"/>
+      </a:schemeClr>
+      <a:schemeClr val="accent1">
+        <a:alpha val="50000"/>
+      </a:schemeClr>
+    </dgm:linClrLst>
+    <dgm:effectClrLst/>
+    <dgm:txLinClrLst/>
+    <dgm:txFillClrLst/>
+    <dgm:txEffectClrLst/>
+  </dgm:styleLbl>
+  <dgm:styleLbl name="lnNode1">
+    <dgm:fillClrLst>
+      <a:schemeClr val="accent1">
+        <a:shade val="90000"/>
+      </a:schemeClr>
+      <a:schemeClr val="accent1">
+        <a:alpha val="50000"/>
+        <a:tint val="50000"/>
+      </a:schemeClr>
+    </dgm:fillClrLst>
+    <dgm:linClrLst meth="repeat">
+      <a:schemeClr val="lt1"/>
+    </dgm:linClrLst>
+    <dgm:effectClrLst/>
+    <dgm:txLinClrLst/>
+    <dgm:txFillClrLst/>
+    <dgm:txEffectClrLst/>
+  </dgm:styleLbl>
+  <dgm:styleLbl name="vennNode1">
+    <dgm:fillClrLst>
+      <a:schemeClr val="accent1">
+        <a:shade val="80000"/>
+        <a:alpha val="50000"/>
+      </a:schemeClr>
+      <a:schemeClr val="accent1">
+        <a:alpha val="80000"/>
+      </a:schemeClr>
+    </dgm:fillClrLst>
+    <dgm:linClrLst meth="repeat">
+      <a:schemeClr val="lt1"/>
+    </dgm:linClrLst>
+    <dgm:effectClrLst/>
+    <dgm:txLinClrLst/>
+    <dgm:txFillClrLst/>
+    <dgm:txEffectClrLst/>
+  </dgm:styleLbl>
+  <dgm:styleLbl name="node2">
+    <dgm:fillClrLst>
+      <a:schemeClr val="accent1">
+        <a:alpha val="70000"/>
+      </a:schemeClr>
+    </dgm:fillClrLst>
+    <dgm:linClrLst meth="repeat">
+      <a:schemeClr val="lt1"/>
+    </dgm:linClrLst>
+    <dgm:effectClrLst/>
+    <dgm:txLinClrLst/>
+    <dgm:txFillClrLst/>
+    <dgm:txEffectClrLst/>
+  </dgm:styleLbl>
+  <dgm:styleLbl name="node3">
+    <dgm:fillClrLst>
+      <a:schemeClr val="accent1">
+        <a:alpha val="50000"/>
+      </a:schemeClr>
+    </dgm:fillClrLst>
+    <dgm:linClrLst meth="repeat">
+      <a:schemeClr val="lt1"/>
+    </dgm:linClrLst>
+    <dgm:effectClrLst/>
+    <dgm:txLinClrLst/>
+    <dgm:txFillClrLst/>
+    <dgm:txEffectClrLst/>
+  </dgm:styleLbl>
+  <dgm:styleLbl name="node4">
+    <dgm:fillClrLst>
+      <a:schemeClr val="accent1">
+        <a:alpha val="30000"/>
+      </a:schemeClr>
+    </dgm:fillClrLst>
+    <dgm:linClrLst meth="repeat">
+      <a:schemeClr val="lt1"/>
+    </dgm:linClrLst>
+    <dgm:effectClrLst/>
+    <dgm:txLinClrLst/>
+    <dgm:txFillClrLst/>
+    <dgm:txEffectClrLst/>
+  </dgm:styleLbl>
+  <dgm:styleLbl name="fgImgPlace1">
+    <dgm:fillClrLst>
+      <a:schemeClr val="accent1">
+        <a:tint val="50000"/>
+        <a:alpha val="90000"/>
+      </a:schemeClr>
+      <a:schemeClr val="accent1">
+        <a:tint val="20000"/>
+        <a:alpha val="50000"/>
+      </a:schemeClr>
+    </dgm:fillClrLst>
+    <dgm:linClrLst meth="repeat">
+      <a:schemeClr val="lt1"/>
+    </dgm:linClrLst>
+    <dgm:effectClrLst/>
+    <dgm:txLinClrLst/>
+    <dgm:txFillClrLst meth="repeat">
+      <a:schemeClr val="lt1"/>
+    </dgm:txFillClrLst>
+    <dgm:txEffectClrLst/>
+  </dgm:styleLbl>
+  <dgm:styleLbl name="alignImgPlace1">
+    <dgm:fillClrLst>
+      <a:schemeClr val="accent1">
+        <a:tint val="50000"/>
+      </a:schemeClr>
+      <a:schemeClr val="accent1">
+        <a:tint val="20000"/>
+      </a:schemeClr>
+    </dgm:fillClrLst>
+    <dgm:linClrLst meth="repeat">
+      <a:schemeClr val="lt1"/>
+    </dgm:linClrLst>
+    <dgm:effectClrLst/>
+    <dgm:txLinClrLst/>
+    <dgm:txFillClrLst meth="repeat">
+      <a:schemeClr val="lt1"/>
+    </dgm:txFillClrLst>
+    <dgm:txEffectClrLst/>
+  </dgm:styleLbl>
+  <dgm:styleLbl name="bgImgPlace1">
+    <dgm:fillClrLst>
+      <a:schemeClr val="accent1">
+        <a:tint val="50000"/>
+      </a:schemeClr>
+      <a:schemeClr val="accent1">
+        <a:tint val="20000"/>
+      </a:schemeClr>
+    </dgm:fillClrLst>
+    <dgm:linClrLst meth="repeat">
+      <a:schemeClr val="lt1"/>
+    </dgm:linClrLst>
+    <dgm:effectClrLst/>
+    <dgm:txLinClrLst/>
+    <dgm:txFillClrLst meth="repeat">
+      <a:schemeClr val="lt1"/>
+    </dgm:txFillClrLst>
+    <dgm:txEffectClrLst/>
+  </dgm:styleLbl>
+  <dgm:styleLbl name="sibTrans2D1">
+    <dgm:fillClrLst>
+      <a:schemeClr val="accent1">
+        <a:shade val="90000"/>
+      </a:schemeClr>
+      <a:schemeClr val="accent1">
+        <a:tint val="50000"/>
+      </a:schemeClr>
+    </dgm:fillClrLst>
+    <dgm:linClrLst>
+      <a:schemeClr val="accent1">
+        <a:shade val="90000"/>
+      </a:schemeClr>
+      <a:schemeClr val="accent1">
+        <a:tint val="50000"/>
+      </a:schemeClr>
+    </dgm:linClrLst>
+    <dgm:effectClrLst/>
+    <dgm:txLinClrLst/>
+    <dgm:txFillClrLst/>
+    <dgm:txEffectClrLst/>
+  </dgm:styleLbl>
+  <dgm:styleLbl name="fgSibTrans2D1">
+    <dgm:fillClrLst>
+      <a:schemeClr val="accent1">
+        <a:shade val="90000"/>
+      </a:schemeClr>
+      <a:schemeClr val="accent1">
+        <a:tint val="50000"/>
+      </a:schemeClr>
+    </dgm:fillClrLst>
+    <dgm:linClrLst>
+      <a:schemeClr val="accent1">
+        <a:shade val="90000"/>
+      </a:schemeClr>
+      <a:schemeClr val="accent1">
+        <a:tint val="50000"/>
+      </a:schemeClr>
+    </dgm:linClrLst>
+    <dgm:effectClrLst/>
+    <dgm:txLinClrLst/>
+    <dgm:txFillClrLst/>
+    <dgm:txEffectClrLst/>
+  </dgm:styleLbl>
+  <dgm:styleLbl name="bgSibTrans2D1">
+    <dgm:fillClrLst>
+      <a:schemeClr val="accent1">
+        <a:shade val="90000"/>
+      </a:schemeClr>
+      <a:schemeClr val="accent1">
+        <a:tint val="50000"/>
+      </a:schemeClr>
+    </dgm:fillClrLst>
+    <dgm:linClrLst>
+      <a:schemeClr val="accent1">
+        <a:shade val="90000"/>
+      </a:schemeClr>
+      <a:schemeClr val="accent1">
+        <a:tint val="50000"/>
+      </a:schemeClr>
+    </dgm:linClrLst>
+    <dgm:effectClrLst/>
+    <dgm:txLinClrLst/>
+    <dgm:txFillClrLst/>
+    <dgm:txEffectClrLst/>
+  </dgm:styleLbl>
+  <dgm:styleLbl name="sibTrans1D1">
+    <dgm:fillClrLst>
+      <a:schemeClr val="accent1">
+        <a:shade val="90000"/>
+      </a:schemeClr>
+      <a:schemeClr val="accent1">
+        <a:tint val="50000"/>
+      </a:schemeClr>
+    </dgm:fillClrLst>
+    <dgm:linClrLst>
+      <a:schemeClr val="accent1">
+        <a:shade val="90000"/>
+      </a:schemeClr>
+      <a:schemeClr val="accent1">
+        <a:tint val="50000"/>
+      </a:schemeClr>
+    </dgm:linClrLst>
+    <dgm:effectClrLst/>
+    <dgm:txLinClrLst/>
+    <dgm:txFillClrLst meth="repeat">
+      <a:schemeClr val="tx1"/>
+    </dgm:txFillClrLst>
+    <dgm:txEffectClrLst/>
+  </dgm:styleLbl>
+  <dgm:styleLbl name="callout">
+    <dgm:fillClrLst meth="repeat">
+      <a:schemeClr val="accent1"/>
+    </dgm:fillClrLst>
+    <dgm:linClrLst meth="repeat">
+      <a:schemeClr val="accent1"/>
+    </dgm:linClrLst>
+    <dgm:effectClrLst/>
+    <dgm:txLinClrLst/>
+    <dgm:txFillClrLst meth="repeat">
+      <a:schemeClr val="tx1"/>
+    </dgm:txFillClrLst>
+    <dgm:txEffectClrLst/>
+  </dgm:styleLbl>
+  <dgm:styleLbl name="asst0">
+    <dgm:fillClrLst meth="repeat">
+      <a:schemeClr val="accent1">
+        <a:alpha val="90000"/>
+      </a:schemeClr>
+    </dgm:fillClrLst>
+    <dgm:linClrLst meth="repeat">
+      <a:schemeClr val="lt1"/>
+    </dgm:linClrLst>
+    <dgm:effectClrLst/>
+    <dgm:txLinClrLst/>
+    <dgm:txFillClrLst/>
+    <dgm:txEffectClrLst/>
+  </dgm:styleLbl>
+  <dgm:styleLbl name="asst1">
+    <dgm:fillClrLst meth="repeat">
+      <a:schemeClr val="accent1">
+        <a:alpha val="90000"/>
+      </a:schemeClr>
+    </dgm:fillClrLst>
+    <dgm:linClrLst meth="repeat">
+      <a:schemeClr val="lt1"/>
+    </dgm:linClrLst>
+    <dgm:effectClrLst/>
+    <dgm:txLinClrLst/>
+    <dgm:txFillClrLst/>
+    <dgm:txEffectClrLst/>
+  </dgm:styleLbl>
+  <dgm:styleLbl name="asst2">
+    <dgm:fillClrLst>
+      <a:schemeClr val="accent1">
+        <a:alpha val="90000"/>
+      </a:schemeClr>
+    </dgm:fillClrLst>
+    <dgm:linClrLst meth="repeat">
+      <a:schemeClr val="lt1"/>
+    </dgm:linClrLst>
+    <dgm:effectClrLst/>
+    <dgm:txLinClrLst/>
+    <dgm:txFillClrLst/>
+    <dgm:txEffectClrLst/>
+  </dgm:styleLbl>
+  <dgm:styleLbl name="asst3">
+    <dgm:fillClrLst>
+      <a:schemeClr val="accent1">
+        <a:alpha val="70000"/>
+      </a:schemeClr>
+    </dgm:fillClrLst>
+    <dgm:linClrLst meth="repeat">
+      <a:schemeClr val="lt1"/>
+    </dgm:linClrLst>
+    <dgm:effectClrLst/>
+    <dgm:txLinClrLst/>
+    <dgm:txFillClrLst/>
+    <dgm:txEffectClrLst/>
+  </dgm:styleLbl>
+  <dgm:styleLbl name="asst4">
+    <dgm:fillClrLst>
+      <a:schemeClr val="accent1">
+        <a:alpha val="50000"/>
+      </a:schemeClr>
+    </dgm:fillClrLst>
+    <dgm:linClrLst meth="repeat">
+      <a:schemeClr val="lt1"/>
+    </dgm:linClrLst>
+    <dgm:effectClrLst/>
+    <dgm:txLinClrLst/>
+    <dgm:txFillClrLst/>
+    <dgm:txEffectClrLst/>
+  </dgm:styleLbl>
+  <dgm:styleLbl name="parChTrans2D1">
+    <dgm:fillClrLst meth="repeat">
+      <a:schemeClr val="accent1">
+        <a:shade val="80000"/>
+      </a:schemeClr>
+    </dgm:fillClrLst>
+    <dgm:linClrLst meth="repeat">
+      <a:schemeClr val="accent1">
+        <a:shade val="80000"/>
+      </a:schemeClr>
+    </dgm:linClrLst>
+    <dgm:effectClrLst/>
+    <dgm:txLinClrLst/>
+    <dgm:txFillClrLst/>
+    <dgm:txEffectClrLst/>
+  </dgm:styleLbl>
+  <dgm:styleLbl name="parChTrans2D2">
+    <dgm:fillClrLst meth="repeat">
+      <a:schemeClr val="accent1">
+        <a:tint val="90000"/>
+      </a:schemeClr>
+    </dgm:fillClrLst>
+    <dgm:linClrLst meth="repeat">
+      <a:schemeClr val="accent1">
+        <a:tint val="90000"/>
+      </a:schemeClr>
+    </dgm:linClrLst>
+    <dgm:effectClrLst/>
+    <dgm:txLinClrLst/>
+    <dgm:txFillClrLst/>
+    <dgm:txEffectClrLst/>
+  </dgm:styleLbl>
+  <dgm:styleLbl name="parChTrans2D3">
+    <dgm:fillClrLst meth="repeat">
+      <a:schemeClr val="accent1">
+        <a:tint val="70000"/>
+      </a:schemeClr>
+    </dgm:fillClrLst>
+    <dgm:linClrLst meth="repeat">
+      <a:schemeClr val="accent1">
+        <a:tint val="70000"/>
+      </a:schemeClr>
+    </dgm:linClrLst>
+    <dgm:effectClrLst/>
+    <dgm:txLinClrLst/>
+    <dgm:txFillClrLst/>
+    <dgm:txEffectClrLst/>
+  </dgm:styleLbl>
+  <dgm:styleLbl name="parChTrans2D4">
+    <dgm:fillClrLst meth="repeat">
+      <a:schemeClr val="accent1">
+        <a:tint val="50000"/>
+      </a:schemeClr>
+    </dgm:fillClrLst>
+    <dgm:linClrLst meth="repeat">
+      <a:schemeClr val="accent1">
+        <a:tint val="50000"/>
+      </a:schemeClr>
+    </dgm:linClrLst>
+    <dgm:effectClrLst/>
+    <dgm:txLinClrLst/>
+    <dgm:txFillClrLst meth="repeat">
+      <a:schemeClr val="dk1"/>
+    </dgm:txFillClrLst>
+    <dgm:txEffectClrLst/>
+  </dgm:styleLbl>
+  <dgm:styleLbl name="parChTrans1D1">
+    <dgm:fillClrLst meth="repeat">
+      <a:schemeClr val="accent1">
+        <a:shade val="80000"/>
+      </a:schemeClr>
+    </dgm:fillClrLst>
+    <dgm:linClrLst meth="repeat">
+      <a:schemeClr val="accent1">
+        <a:shade val="80000"/>
+      </a:schemeClr>
+    </dgm:linClrLst>
+    <dgm:effectClrLst/>
+    <dgm:txLinClrLst/>
+    <dgm:txFillClrLst meth="repeat">
+      <a:schemeClr val="tx1"/>
+    </dgm:txFillClrLst>
+    <dgm:txEffectClrLst/>
+  </dgm:styleLbl>
+  <dgm:styleLbl name="parChTrans1D2">
+    <dgm:fillClrLst meth="repeat">
+      <a:schemeClr val="accent1">
+        <a:tint val="90000"/>
+      </a:schemeClr>
+    </dgm:fillClrLst>
+    <dgm:linClrLst meth="repeat">
+      <a:schemeClr val="accent1">
+        <a:tint val="90000"/>
+      </a:schemeClr>
+    </dgm:linClrLst>
+    <dgm:effectClrLst/>
+    <dgm:txLinClrLst/>
+    <dgm:txFillClrLst meth="repeat">
+      <a:schemeClr val="tx1"/>
+    </dgm:txFillClrLst>
+    <dgm:txEffectClrLst/>
+  </dgm:styleLbl>
+  <dgm:styleLbl name="parChTrans1D3">
+    <dgm:fillClrLst meth="repeat">
+      <a:schemeClr val="accent1">
+        <a:tint val="70000"/>
+      </a:schemeClr>
+    </dgm:fillClrLst>
+    <dgm:linClrLst meth="repeat">
+      <a:schemeClr val="accent1">
+        <a:tint val="70000"/>
+      </a:schemeClr>
+    </dgm:linClrLst>
+    <dgm:effectClrLst/>
+    <dgm:txLinClrLst/>
+    <dgm:txFillClrLst meth="repeat">
+      <a:schemeClr val="tx1"/>
+    </dgm:txFillClrLst>
+    <dgm:txEffectClrLst/>
+  </dgm:styleLbl>
+  <dgm:styleLbl name="parChTrans1D4">
+    <dgm:fillClrLst meth="repeat">
+      <a:schemeClr val="accent1">
+        <a:tint val="50000"/>
+      </a:schemeClr>
+    </dgm:fillClrLst>
+    <dgm:linClrLst meth="repeat">
+      <a:schemeClr val="accent1">
+        <a:tint val="50000"/>
+      </a:schemeClr>
+    </dgm:linClrLst>
+    <dgm:effectClrLst/>
+    <dgm:txLinClrLst/>
+    <dgm:txFillClrLst meth="repeat">
+      <a:schemeClr val="tx1"/>
+    </dgm:txFillClrLst>
+    <dgm:txEffectClrLst/>
+  </dgm:styleLbl>
+  <dgm:styleLbl name="fgAcc1">
+    <dgm:fillClrLst meth="repeat">
+      <a:schemeClr val="lt1">
+        <a:alpha val="90000"/>
+      </a:schemeClr>
+    </dgm:fillClrLst>
+    <dgm:linClrLst>
+      <a:schemeClr val="accent1">
+        <a:alpha val="90000"/>
+      </a:schemeClr>
+      <a:schemeClr val="accent1">
+        <a:alpha val="50000"/>
+      </a:schemeClr>
+    </dgm:linClrLst>
+    <dgm:effectClrLst/>
+    <dgm:txLinClrLst/>
+    <dgm:txFillClrLst meth="repeat">
+      <a:schemeClr val="dk1"/>
+    </dgm:txFillClrLst>
+    <dgm:txEffectClrLst/>
+  </dgm:styleLbl>
+  <dgm:styleLbl name="conFgAcc1">
+    <dgm:fillClrLst meth="repeat">
+      <a:schemeClr val="lt1">
+        <a:alpha val="90000"/>
+      </a:schemeClr>
+    </dgm:fillClrLst>
+    <dgm:linClrLst>
+      <a:schemeClr val="accent1">
+        <a:alpha val="90000"/>
+      </a:schemeClr>
+      <a:schemeClr val="accent1">
+        <a:alpha val="50000"/>
+      </a:schemeClr>
+    </dgm:linClrLst>
+    <dgm:effectClrLst/>
+    <dgm:txLinClrLst/>
+    <dgm:txFillClrLst meth="repeat">
+      <a:schemeClr val="dk1"/>
+    </dgm:txFillClrLst>
+    <dgm:txEffectClrLst/>
+  </dgm:styleLbl>
+  <dgm:styleLbl name="alignAcc1">
+    <dgm:fillClrLst meth="repeat">
+      <a:schemeClr val="lt1">
+        <a:alpha val="90000"/>
+      </a:schemeClr>
+    </dgm:fillClrLst>
+    <dgm:linClrLst>
+      <a:schemeClr val="accent1">
+        <a:alpha val="90000"/>
+      </a:schemeClr>
+      <a:schemeClr val="accent1">
+        <a:alpha val="50000"/>
+      </a:schemeClr>
+    </dgm:linClrLst>
+    <dgm:effectClrLst/>
+    <dgm:txLinClrLst/>
+    <dgm:txFillClrLst meth="repeat">
+      <a:schemeClr val="dk1"/>
+    </dgm:txFillClrLst>
+    <dgm:txEffectClrLst/>
+  </dgm:styleLbl>
+  <dgm:styleLbl name="trAlignAcc1">
+    <dgm:fillClrLst meth="repeat">
+      <a:schemeClr val="lt1">
+        <a:alpha val="40000"/>
+      </a:schemeClr>
+    </dgm:fillClrLst>
+    <dgm:linClrLst>
+      <a:schemeClr val="accent1">
+        <a:alpha val="90000"/>
+      </a:schemeClr>
+      <a:schemeClr val="accent1">
+        <a:alpha val="50000"/>
+      </a:schemeClr>
+    </dgm:linClrLst>
+    <dgm:effectClrLst/>
+    <dgm:txLinClrLst/>
+    <dgm:txFillClrLst meth="repeat">
+      <a:schemeClr val="dk1"/>
+    </dgm:txFillClrLst>
+    <dgm:txEffectClrLst/>
+  </dgm:styleLbl>
+  <dgm:styleLbl name="bgAcc1">
+    <dgm:fillClrLst meth="repeat">
+      <a:schemeClr val="lt1">
+        <a:alpha val="90000"/>
+      </a:schemeClr>
+    </dgm:fillClrLst>
+    <dgm:linClrLst>
+      <a:schemeClr val="accent1">
+        <a:alpha val="90000"/>
+      </a:schemeClr>
+      <a:schemeClr val="accent1">
+        <a:alpha val="50000"/>
+      </a:schemeClr>
+    </dgm:linClrLst>
+    <dgm:effectClrLst/>
+    <dgm:txLinClrLst/>
+    <dgm:txFillClrLst meth="repeat">
+      <a:schemeClr val="dk1"/>
+    </dgm:txFillClrLst>
+    <dgm:txEffectClrLst/>
+  </dgm:styleLbl>
+  <dgm:styleLbl name="solidFgAcc1">
+    <dgm:fillClrLst meth="repeat">
+      <a:schemeClr val="lt1"/>
+    </dgm:fillClrLst>
+    <dgm:linClrLst>
+      <a:schemeClr val="accent1">
+        <a:alpha val="90000"/>
+      </a:schemeClr>
+      <a:schemeClr val="accent1">
+        <a:alpha val="50000"/>
+      </a:schemeClr>
+    </dgm:linClrLst>
+    <dgm:effectClrLst/>
+    <dgm:txLinClrLst/>
+    <dgm:txFillClrLst meth="repeat">
+      <a:schemeClr val="dk1"/>
+    </dgm:txFillClrLst>
+    <dgm:txEffectClrLst/>
+  </dgm:styleLbl>
+  <dgm:styleLbl name="solidAlignAcc1">
+    <dgm:fillClrLst meth="repeat">
+      <a:schemeClr val="lt1"/>
+    </dgm:fillClrLst>
+    <dgm:linClrLst meth="repeat">
+      <a:schemeClr val="accent1"/>
+    </dgm:linClrLst>
+    <dgm:effectClrLst/>
+    <dgm:txLinClrLst/>
+    <dgm:txFillClrLst meth="repeat">
+      <a:schemeClr val="dk1"/>
+    </dgm:txFillClrLst>
+    <dgm:txEffectClrLst/>
+  </dgm:styleLbl>
+  <dgm:styleLbl name="solidBgAcc1">
+    <dgm:fillClrLst meth="repeat">
+      <a:schemeClr val="lt1"/>
+    </dgm:fillClrLst>
+    <dgm:linClrLst meth="repeat">
+      <a:schemeClr val="accent1"/>
+    </dgm:linClrLst>
+    <dgm:effectClrLst/>
+    <dgm:txLinClrLst/>
+    <dgm:txFillClrLst meth="repeat">
+      <a:schemeClr val="dk1"/>
+    </dgm:txFillClrLst>
+    <dgm:txEffectClrLst/>
+  </dgm:styleLbl>
+  <dgm:styleLbl name="fgAccFollowNode1">
+    <dgm:fillClrLst>
+      <a:schemeClr val="accent1">
+        <a:alpha val="90000"/>
+        <a:tint val="40000"/>
+      </a:schemeClr>
+      <a:schemeClr val="accent1">
+        <a:alpha val="50000"/>
+        <a:tint val="40000"/>
+      </a:schemeClr>
+    </dgm:fillClrLst>
+    <dgm:linClrLst meth="repeat">
+      <a:schemeClr val="accent1">
+        <a:alpha val="90000"/>
+        <a:tint val="40000"/>
+      </a:schemeClr>
+    </dgm:linClrLst>
+    <dgm:effectClrLst/>
+    <dgm:txLinClrLst/>
+    <dgm:txFillClrLst meth="repeat">
+      <a:schemeClr val="dk1"/>
+    </dgm:txFillClrLst>
+    <dgm:txEffectClrLst/>
+  </dgm:styleLbl>
+  <dgm:styleLbl name="alignAccFollowNode1">
+    <dgm:fillClrLst meth="repeat">
+      <a:schemeClr val="accent1">
+        <a:alpha val="90000"/>
+        <a:tint val="40000"/>
+      </a:schemeClr>
+    </dgm:fillClrLst>
+    <dgm:linClrLst meth="repeat">
+      <a:schemeClr val="accent1">
+        <a:alpha val="90000"/>
+        <a:tint val="40000"/>
+      </a:schemeClr>
+    </dgm:linClrLst>
+    <dgm:effectClrLst/>
+    <dgm:txLinClrLst/>
+    <dgm:txFillClrLst meth="repeat">
+      <a:schemeClr val="dk1"/>
+    </dgm:txFillClrLst>
+    <dgm:txEffectClrLst/>
+  </dgm:styleLbl>
+  <dgm:styleLbl name="bgAccFollowNode1">
+    <dgm:fillClrLst meth="repeat">
+      <a:schemeClr val="accent1">
+        <a:alpha val="90000"/>
+        <a:tint val="40000"/>
+      </a:schemeClr>
+    </dgm:fillClrLst>
+    <dgm:linClrLst meth="repeat">
+      <a:schemeClr val="lt1"/>
+    </dgm:linClrLst>
+    <dgm:effectClrLst/>
+    <dgm:txLinClrLst/>
+    <dgm:txFillClrLst meth="repeat">
+      <a:schemeClr val="dk1"/>
+    </dgm:txFillClrLst>
+    <dgm:txEffectClrLst/>
+  </dgm:styleLbl>
+  <dgm:styleLbl name="fgAcc0">
+    <dgm:fillClrLst meth="repeat">
+      <a:schemeClr val="lt1">
+        <a:alpha val="90000"/>
+      </a:schemeClr>
+    </dgm:fillClrLst>
+    <dgm:linClrLst meth="repeat">
+      <a:schemeClr val="accent1">
+        <a:shade val="80000"/>
+      </a:schemeClr>
+    </dgm:linClrLst>
+    <dgm:effectClrLst/>
+    <dgm:txLinClrLst/>
+    <dgm:txFillClrLst meth="repeat">
+      <a:schemeClr val="dk1"/>
+    </dgm:txFillClrLst>
+    <dgm:txEffectClrLst/>
+  </dgm:styleLbl>
+  <dgm:styleLbl name="fgAcc2">
+    <dgm:fillClrLst meth="repeat">
+      <a:schemeClr val="lt1">
+        <a:alpha val="90000"/>
+      </a:schemeClr>
+    </dgm:fillClrLst>
+    <dgm:linClrLst meth="repeat">
+      <a:schemeClr val="accent1">
+        <a:tint val="90000"/>
+      </a:schemeClr>
+    </dgm:linClrLst>
+    <dgm:effectClrLst/>
+    <dgm:txLinClrLst/>
+    <dgm:txFillClrLst meth="repeat">
+      <a:schemeClr val="dk1"/>
+    </dgm:txFillClrLst>
+    <dgm:txEffectClrLst/>
+  </dgm:styleLbl>
+  <dgm:styleLbl name="fgAcc3">
+    <dgm:fillClrLst meth="repeat">
+      <a:schemeClr val="lt1">
+        <a:alpha val="90000"/>
+      </a:schemeClr>
+    </dgm:fillClrLst>
+    <dgm:linClrLst meth="repeat">
+      <a:schemeClr val="accent1">
+        <a:tint val="70000"/>
+      </a:schemeClr>
+    </dgm:linClrLst>
+    <dgm:effectClrLst/>
+    <dgm:txLinClrLst/>
+    <dgm:txFillClrLst meth="repeat">
+      <a:schemeClr val="dk1"/>
+    </dgm:txFillClrLst>
+    <dgm:txEffectClrLst/>
+  </dgm:styleLbl>
+  <dgm:styleLbl name="fgAcc4">
+    <dgm:fillClrLst meth="repeat">
+      <a:schemeClr val="lt1">
+        <a:alpha val="90000"/>
+      </a:schemeClr>
+    </dgm:fillClrLst>
+    <dgm:linClrLst meth="repeat">
+      <a:schemeClr val="accent1">
+        <a:tint val="50000"/>
+      </a:schemeClr>
+    </dgm:linClrLst>
+    <dgm:effectClrLst/>
+    <dgm:txLinClrLst/>
+    <dgm:txFillClrLst meth="repeat">
+      <a:schemeClr val="dk1"/>
+    </dgm:txFillClrLst>
+    <dgm:txEffectClrLst/>
+  </dgm:styleLbl>
+  <dgm:styleLbl name="bgShp">
+    <dgm:fillClrLst meth="repeat">
+      <a:schemeClr val="accent1">
+        <a:tint val="40000"/>
+      </a:schemeClr>
+    </dgm:fillClrLst>
+    <dgm:linClrLst meth="repeat">
+      <a:schemeClr val="dk1"/>
+    </dgm:linClrLst>
+    <dgm:effectClrLst/>
+    <dgm:txLinClrLst/>
+    <dgm:txFillClrLst meth="repeat">
+      <a:schemeClr val="dk1"/>
+    </dgm:txFillClrLst>
+    <dgm:txEffectClrLst/>
+  </dgm:styleLbl>
+  <dgm:styleLbl name="dkBgShp">
+    <dgm:fillClrLst meth="repeat">
+      <a:schemeClr val="accent1">
+        <a:shade val="90000"/>
+      </a:schemeClr>
+    </dgm:fillClrLst>
+    <dgm:linClrLst meth="repeat">
+      <a:schemeClr val="dk1"/>
+    </dgm:linClrLst>
+    <dgm:effectClrLst/>
+    <dgm:txLinClrLst/>
+    <dgm:txFillClrLst meth="repeat">
+      <a:schemeClr val="lt1"/>
+    </dgm:txFillClrLst>
+    <dgm:txEffectClrLst/>
+  </dgm:styleLbl>
+  <dgm:styleLbl name="trBgShp">
+    <dgm:fillClrLst meth="repeat">
+      <a:schemeClr val="accent1">
+        <a:tint val="50000"/>
+        <a:alpha val="40000"/>
+      </a:schemeClr>
+    </dgm:fillClrLst>
+    <dgm:linClrLst meth="repeat">
+      <a:schemeClr val="accent1"/>
+    </dgm:linClrLst>
+    <dgm:effectClrLst/>
+    <dgm:txLinClrLst/>
+    <dgm:txFillClrLst meth="repeat">
+      <a:schemeClr val="lt1"/>
+    </dgm:txFillClrLst>
+    <dgm:txEffectClrLst/>
+  </dgm:styleLbl>
+  <dgm:styleLbl name="fgShp">
+    <dgm:fillClrLst meth="repeat">
+      <a:schemeClr val="accent1">
+        <a:tint val="40000"/>
+      </a:schemeClr>
+    </dgm:fillClrLst>
+    <dgm:linClrLst meth="repeat">
+      <a:schemeClr val="lt1"/>
+    </dgm:linClrLst>
+    <dgm:effectClrLst/>
+    <dgm:txLinClrLst/>
+    <dgm:txFillClrLst meth="repeat">
+      <a:schemeClr val="dk1"/>
+    </dgm:txFillClrLst>
+    <dgm:txEffectClrLst/>
+  </dgm:styleLbl>
+  <dgm:styleLbl name="revTx">
+    <dgm:fillClrLst meth="repeat">
+      <a:schemeClr val="lt1">
+        <a:alpha val="0"/>
+      </a:schemeClr>
+    </dgm:fillClrLst>
+    <dgm:linClrLst meth="repeat">
+      <a:schemeClr val="dk1">
+        <a:alpha val="0"/>
+      </a:schemeClr>
+    </dgm:linClrLst>
+    <dgm:effectClrLst/>
+    <dgm:txLinClrLst/>
+    <dgm:txFillClrLst meth="repeat">
+      <a:schemeClr val="tx1"/>
+    </dgm:txFillClrLst>
+    <dgm:txEffectClrLst/>
+  </dgm:styleLbl>
+</dgm:colorsDef>
+</file>
+
+<file path=ppt/diagrams/data1.xml><?xml version="1.0" encoding="utf-8"?>
+<dgm:dataModel xmlns:dgm="http://schemas.openxmlformats.org/drawingml/2006/diagram" xmlns:a="http://schemas.openxmlformats.org/drawingml/2006/main">
+  <dgm:ptLst>
+    <dgm:pt modelId="{0BE0B7E4-7B3A-4C57-8E0D-D9CEC7B2C43F}" type="doc">
+      <dgm:prSet loTypeId="urn:microsoft.com/office/officeart/2005/8/layout/hList3" loCatId="list" qsTypeId="urn:microsoft.com/office/officeart/2005/8/quickstyle/simple5" qsCatId="simple" csTypeId="urn:microsoft.com/office/officeart/2005/8/colors/accent1_5" csCatId="accent1" phldr="1"/>
+      <dgm:spPr/>
+      <dgm:t>
+        <a:bodyPr/>
+        <a:lstStyle/>
+        <a:p>
+          <a:endParaRPr lang="en-US"/>
+        </a:p>
+      </dgm:t>
+    </dgm:pt>
+    <dgm:pt modelId="{DD5F7AAF-112C-4A9A-B0AB-25D201DE691C}">
+      <dgm:prSet phldrT="[Text]"/>
+      <dgm:spPr/>
+      <dgm:t>
+        <a:bodyPr/>
+        <a:lstStyle/>
+        <a:p>
+          <a:r>
+            <a:rPr lang="en-US" dirty="0" smtClean="0"/>
+            <a:t>Reality Check: Hard Limits</a:t>
+          </a:r>
+          <a:endParaRPr lang="en-US" dirty="0"/>
+        </a:p>
+      </dgm:t>
+    </dgm:pt>
+    <dgm:pt modelId="{0AF58B15-8819-4F41-BC31-D4F4990EA83E}" type="parTrans" cxnId="{B22DA03B-039A-45C3-B0D1-DF34E49B1B9C}">
+      <dgm:prSet/>
+      <dgm:spPr/>
+      <dgm:t>
+        <a:bodyPr/>
+        <a:lstStyle/>
+        <a:p>
+          <a:endParaRPr lang="en-US"/>
+        </a:p>
+      </dgm:t>
+    </dgm:pt>
+    <dgm:pt modelId="{D5B6E5C5-8EAC-4BBA-B682-0A6F433BE19D}" type="sibTrans" cxnId="{B22DA03B-039A-45C3-B0D1-DF34E49B1B9C}">
+      <dgm:prSet/>
+      <dgm:spPr/>
+      <dgm:t>
+        <a:bodyPr/>
+        <a:lstStyle/>
+        <a:p>
+          <a:endParaRPr lang="en-US"/>
+        </a:p>
+      </dgm:t>
+    </dgm:pt>
+    <dgm:pt modelId="{FE3C5589-28CC-4922-A515-C6A04D6E4330}">
+      <dgm:prSet phldrT="[Text]"/>
+      <dgm:spPr/>
+      <dgm:t>
+        <a:bodyPr/>
+        <a:lstStyle/>
+        <a:p>
+          <a:r>
+            <a:rPr lang="en-US" u="none" dirty="0" smtClean="0"/>
+            <a:t>Physical Measurements</a:t>
+          </a:r>
+          <a:r>
+            <a:rPr lang="en-US" dirty="0" smtClean="0"/>
+            <a:t/>
+          </a:r>
+          <a:br>
+            <a:rPr lang="en-US" dirty="0" smtClean="0"/>
+          </a:br>
+          <a:r>
+            <a:rPr lang="en-US" b="1" dirty="0" smtClean="0"/>
+            <a:t>Heisenberg</a:t>
+          </a:r>
+        </a:p>
+        <a:p>
+          <a:endParaRPr lang="en-US" dirty="0"/>
+        </a:p>
+      </dgm:t>
+    </dgm:pt>
+    <dgm:pt modelId="{330CFBC0-0F30-4AEE-9E0A-F3FCAA43A528}" type="parTrans" cxnId="{B376B3A8-A7DE-438A-A849-2F6361E8D2EE}">
+      <dgm:prSet/>
+      <dgm:spPr/>
+      <dgm:t>
+        <a:bodyPr/>
+        <a:lstStyle/>
+        <a:p>
+          <a:endParaRPr lang="en-US"/>
+        </a:p>
+      </dgm:t>
+    </dgm:pt>
+    <dgm:pt modelId="{4A8147C1-EB5C-4D75-B688-D44A0CE15C05}" type="sibTrans" cxnId="{B376B3A8-A7DE-438A-A849-2F6361E8D2EE}">
+      <dgm:prSet/>
+      <dgm:spPr/>
+      <dgm:t>
+        <a:bodyPr/>
+        <a:lstStyle/>
+        <a:p>
+          <a:endParaRPr lang="en-US"/>
+        </a:p>
+      </dgm:t>
+    </dgm:pt>
+    <dgm:pt modelId="{1F812C4B-C766-4543-BEE2-04A11E090143}">
+      <dgm:prSet phldrT="[Text]"/>
+      <dgm:spPr/>
+      <dgm:t>
+        <a:bodyPr/>
+        <a:lstStyle/>
+        <a:p>
+          <a:r>
+            <a:rPr lang="en-US" u="none" dirty="0" smtClean="0"/>
+            <a:t>Physical Manipulation</a:t>
+          </a:r>
+          <a:r>
+            <a:rPr lang="en-US" dirty="0" smtClean="0"/>
+            <a:t/>
+          </a:r>
+          <a:br>
+            <a:rPr lang="en-US" dirty="0" smtClean="0"/>
+          </a:br>
+          <a:r>
+            <a:rPr lang="en-US" b="1" dirty="0" smtClean="0"/>
+            <a:t>Thermodynamics</a:t>
+          </a:r>
+        </a:p>
+        <a:p>
+          <a:endParaRPr lang="en-US" dirty="0"/>
+        </a:p>
+      </dgm:t>
+    </dgm:pt>
+    <dgm:pt modelId="{C739A147-2C62-4ACE-90A1-C0955BABC2C4}" type="parTrans" cxnId="{78761B21-9B33-4722-B7FF-1F6CF003FB15}">
+      <dgm:prSet/>
+      <dgm:spPr/>
+      <dgm:t>
+        <a:bodyPr/>
+        <a:lstStyle/>
+        <a:p>
+          <a:endParaRPr lang="en-US"/>
+        </a:p>
+      </dgm:t>
+    </dgm:pt>
+    <dgm:pt modelId="{0A392F54-15FD-4880-AFFC-412D43DAF163}" type="sibTrans" cxnId="{78761B21-9B33-4722-B7FF-1F6CF003FB15}">
+      <dgm:prSet/>
+      <dgm:spPr/>
+      <dgm:t>
+        <a:bodyPr/>
+        <a:lstStyle/>
+        <a:p>
+          <a:endParaRPr lang="en-US"/>
+        </a:p>
+      </dgm:t>
+    </dgm:pt>
+    <dgm:pt modelId="{B8956CD5-9D79-47AB-B9C6-418338D27EF3}">
+      <dgm:prSet phldrT="[Text]"/>
+      <dgm:spPr/>
+      <dgm:t>
+        <a:bodyPr/>
+        <a:lstStyle/>
+        <a:p>
+          <a:r>
+            <a:rPr lang="en-US" u="none" dirty="0" smtClean="0"/>
+            <a:t>Knowledge</a:t>
+          </a:r>
+          <a:r>
+            <a:rPr lang="en-US" dirty="0" smtClean="0"/>
+            <a:t/>
+          </a:r>
+          <a:br>
+            <a:rPr lang="en-US" dirty="0" smtClean="0"/>
+          </a:br>
+          <a:r>
+            <a:rPr lang="en-US" b="1" dirty="0" smtClean="0"/>
+            <a:t>Gödel</a:t>
+          </a:r>
+          <a:r>
+            <a:rPr lang="en-US" dirty="0" smtClean="0"/>
+            <a:t> </a:t>
+          </a:r>
+          <a:r>
+            <a:rPr lang="en-US" b="1" dirty="0" smtClean="0"/>
+            <a:t>Incompleteness</a:t>
+          </a:r>
+        </a:p>
+        <a:p>
+          <a:endParaRPr lang="en-US" dirty="0"/>
+        </a:p>
+      </dgm:t>
+    </dgm:pt>
+    <dgm:pt modelId="{19EE27EE-6D18-4D20-BABE-466DBF73A0A2}" type="parTrans" cxnId="{D8D947B3-BDB5-43D9-B157-ADEE56F9D92E}">
+      <dgm:prSet/>
+      <dgm:spPr/>
+      <dgm:t>
+        <a:bodyPr/>
+        <a:lstStyle/>
+        <a:p>
+          <a:endParaRPr lang="en-US"/>
+        </a:p>
+      </dgm:t>
+    </dgm:pt>
+    <dgm:pt modelId="{90C608AD-AF6B-4DB2-9CD4-5DA607B04748}" type="sibTrans" cxnId="{D8D947B3-BDB5-43D9-B157-ADEE56F9D92E}">
+      <dgm:prSet/>
+      <dgm:spPr/>
+      <dgm:t>
+        <a:bodyPr/>
+        <a:lstStyle/>
+        <a:p>
+          <a:endParaRPr lang="en-US"/>
+        </a:p>
+      </dgm:t>
+    </dgm:pt>
+    <dgm:pt modelId="{07F78074-4D04-47B5-9A4A-73E9D149CFA7}" type="pres">
+      <dgm:prSet presAssocID="{0BE0B7E4-7B3A-4C57-8E0D-D9CEC7B2C43F}" presName="composite" presStyleCnt="0">
+        <dgm:presLayoutVars>
+          <dgm:chMax val="1"/>
+          <dgm:dir/>
+          <dgm:resizeHandles val="exact"/>
+        </dgm:presLayoutVars>
+      </dgm:prSet>
+      <dgm:spPr/>
+    </dgm:pt>
+    <dgm:pt modelId="{80281D6B-4E1C-43D7-99D8-9D8AF1D3DBEF}" type="pres">
+      <dgm:prSet presAssocID="{DD5F7AAF-112C-4A9A-B0AB-25D201DE691C}" presName="roof" presStyleLbl="dkBgShp" presStyleIdx="0" presStyleCnt="2" custLinFactNeighborX="-92500" custLinFactNeighborY="-25000"/>
+      <dgm:spPr/>
+      <dgm:t>
+        <a:bodyPr/>
+        <a:lstStyle/>
+        <a:p>
+          <a:endParaRPr lang="en-US"/>
+        </a:p>
+      </dgm:t>
+    </dgm:pt>
+    <dgm:pt modelId="{ABCA2A22-7012-4CF5-8855-FAC95DE9F141}" type="pres">
+      <dgm:prSet presAssocID="{DD5F7AAF-112C-4A9A-B0AB-25D201DE691C}" presName="pillars" presStyleCnt="0"/>
+      <dgm:spPr/>
+    </dgm:pt>
+    <dgm:pt modelId="{8A58F5C7-FF6B-4E4A-B29F-D6A72C33BE24}" type="pres">
+      <dgm:prSet presAssocID="{DD5F7AAF-112C-4A9A-B0AB-25D201DE691C}" presName="pillar1" presStyleLbl="node1" presStyleIdx="0" presStyleCnt="3">
+        <dgm:presLayoutVars>
+          <dgm:bulletEnabled val="1"/>
+        </dgm:presLayoutVars>
+      </dgm:prSet>
+      <dgm:spPr/>
+      <dgm:t>
+        <a:bodyPr/>
+        <a:lstStyle/>
+        <a:p>
+          <a:endParaRPr lang="en-US"/>
+        </a:p>
+      </dgm:t>
+    </dgm:pt>
+    <dgm:pt modelId="{DFABE977-EA8A-44CD-81E4-CF31AB6A2BCC}" type="pres">
+      <dgm:prSet presAssocID="{1F812C4B-C766-4543-BEE2-04A11E090143}" presName="pillarX" presStyleLbl="node1" presStyleIdx="1" presStyleCnt="3">
+        <dgm:presLayoutVars>
+          <dgm:bulletEnabled val="1"/>
+        </dgm:presLayoutVars>
+      </dgm:prSet>
+      <dgm:spPr/>
+      <dgm:t>
+        <a:bodyPr/>
+        <a:lstStyle/>
+        <a:p>
+          <a:endParaRPr lang="en-US"/>
+        </a:p>
+      </dgm:t>
+    </dgm:pt>
+    <dgm:pt modelId="{AE560A81-FDE0-4A00-8814-E59B8DD569BD}" type="pres">
+      <dgm:prSet presAssocID="{B8956CD5-9D79-47AB-B9C6-418338D27EF3}" presName="pillarX" presStyleLbl="node1" presStyleIdx="2" presStyleCnt="3">
+        <dgm:presLayoutVars>
+          <dgm:bulletEnabled val="1"/>
+        </dgm:presLayoutVars>
+      </dgm:prSet>
+      <dgm:spPr/>
+      <dgm:t>
+        <a:bodyPr/>
+        <a:lstStyle/>
+        <a:p>
+          <a:endParaRPr lang="en-US"/>
+        </a:p>
+      </dgm:t>
+    </dgm:pt>
+    <dgm:pt modelId="{FCD564EC-0CD7-4D89-AF2E-50127DD4F3F0}" type="pres">
+      <dgm:prSet presAssocID="{DD5F7AAF-112C-4A9A-B0AB-25D201DE691C}" presName="base" presStyleLbl="dkBgShp" presStyleIdx="1" presStyleCnt="2"/>
+      <dgm:spPr/>
+    </dgm:pt>
+  </dgm:ptLst>
+  <dgm:cxnLst>
+    <dgm:cxn modelId="{B22DA03B-039A-45C3-B0D1-DF34E49B1B9C}" srcId="{0BE0B7E4-7B3A-4C57-8E0D-D9CEC7B2C43F}" destId="{DD5F7AAF-112C-4A9A-B0AB-25D201DE691C}" srcOrd="0" destOrd="0" parTransId="{0AF58B15-8819-4F41-BC31-D4F4990EA83E}" sibTransId="{D5B6E5C5-8EAC-4BBA-B682-0A6F433BE19D}"/>
+    <dgm:cxn modelId="{78761B21-9B33-4722-B7FF-1F6CF003FB15}" srcId="{DD5F7AAF-112C-4A9A-B0AB-25D201DE691C}" destId="{1F812C4B-C766-4543-BEE2-04A11E090143}" srcOrd="1" destOrd="0" parTransId="{C739A147-2C62-4ACE-90A1-C0955BABC2C4}" sibTransId="{0A392F54-15FD-4880-AFFC-412D43DAF163}"/>
+    <dgm:cxn modelId="{300E60B2-40D7-46A2-AE63-D3BC203D6E08}" type="presOf" srcId="{DD5F7AAF-112C-4A9A-B0AB-25D201DE691C}" destId="{80281D6B-4E1C-43D7-99D8-9D8AF1D3DBEF}" srcOrd="0" destOrd="0" presId="urn:microsoft.com/office/officeart/2005/8/layout/hList3"/>
+    <dgm:cxn modelId="{ED6505E7-8197-4ECD-A44A-6B97446BA520}" type="presOf" srcId="{1F812C4B-C766-4543-BEE2-04A11E090143}" destId="{DFABE977-EA8A-44CD-81E4-CF31AB6A2BCC}" srcOrd="0" destOrd="0" presId="urn:microsoft.com/office/officeart/2005/8/layout/hList3"/>
+    <dgm:cxn modelId="{6EBCD054-98D6-4D75-8368-A8DAE9FEED66}" type="presOf" srcId="{FE3C5589-28CC-4922-A515-C6A04D6E4330}" destId="{8A58F5C7-FF6B-4E4A-B29F-D6A72C33BE24}" srcOrd="0" destOrd="0" presId="urn:microsoft.com/office/officeart/2005/8/layout/hList3"/>
+    <dgm:cxn modelId="{D8D947B3-BDB5-43D9-B157-ADEE56F9D92E}" srcId="{DD5F7AAF-112C-4A9A-B0AB-25D201DE691C}" destId="{B8956CD5-9D79-47AB-B9C6-418338D27EF3}" srcOrd="2" destOrd="0" parTransId="{19EE27EE-6D18-4D20-BABE-466DBF73A0A2}" sibTransId="{90C608AD-AF6B-4DB2-9CD4-5DA607B04748}"/>
+    <dgm:cxn modelId="{7BA506CE-B74F-4CC4-9823-5C3D2DD28F8E}" type="presOf" srcId="{B8956CD5-9D79-47AB-B9C6-418338D27EF3}" destId="{AE560A81-FDE0-4A00-8814-E59B8DD569BD}" srcOrd="0" destOrd="0" presId="urn:microsoft.com/office/officeart/2005/8/layout/hList3"/>
+    <dgm:cxn modelId="{A85192B7-D7D6-40F0-8C41-7D4DAFACBC26}" type="presOf" srcId="{0BE0B7E4-7B3A-4C57-8E0D-D9CEC7B2C43F}" destId="{07F78074-4D04-47B5-9A4A-73E9D149CFA7}" srcOrd="0" destOrd="0" presId="urn:microsoft.com/office/officeart/2005/8/layout/hList3"/>
+    <dgm:cxn modelId="{B376B3A8-A7DE-438A-A849-2F6361E8D2EE}" srcId="{DD5F7AAF-112C-4A9A-B0AB-25D201DE691C}" destId="{FE3C5589-28CC-4922-A515-C6A04D6E4330}" srcOrd="0" destOrd="0" parTransId="{330CFBC0-0F30-4AEE-9E0A-F3FCAA43A528}" sibTransId="{4A8147C1-EB5C-4D75-B688-D44A0CE15C05}"/>
+    <dgm:cxn modelId="{CF89DCBE-014C-44D5-938E-1F6DF94FAD35}" type="presParOf" srcId="{07F78074-4D04-47B5-9A4A-73E9D149CFA7}" destId="{80281D6B-4E1C-43D7-99D8-9D8AF1D3DBEF}" srcOrd="0" destOrd="0" presId="urn:microsoft.com/office/officeart/2005/8/layout/hList3"/>
+    <dgm:cxn modelId="{6C61A940-3279-4BDC-961E-DD421BF9BD28}" type="presParOf" srcId="{07F78074-4D04-47B5-9A4A-73E9D149CFA7}" destId="{ABCA2A22-7012-4CF5-8855-FAC95DE9F141}" srcOrd="1" destOrd="0" presId="urn:microsoft.com/office/officeart/2005/8/layout/hList3"/>
+    <dgm:cxn modelId="{4E693597-8918-461A-B7AF-97BD7573EEFE}" type="presParOf" srcId="{ABCA2A22-7012-4CF5-8855-FAC95DE9F141}" destId="{8A58F5C7-FF6B-4E4A-B29F-D6A72C33BE24}" srcOrd="0" destOrd="0" presId="urn:microsoft.com/office/officeart/2005/8/layout/hList3"/>
+    <dgm:cxn modelId="{3F623073-68EA-46D7-8487-3B6656E7EA0B}" type="presParOf" srcId="{ABCA2A22-7012-4CF5-8855-FAC95DE9F141}" destId="{DFABE977-EA8A-44CD-81E4-CF31AB6A2BCC}" srcOrd="1" destOrd="0" presId="urn:microsoft.com/office/officeart/2005/8/layout/hList3"/>
+    <dgm:cxn modelId="{5C1C7421-E1AD-4173-BC59-065998D6F72E}" type="presParOf" srcId="{ABCA2A22-7012-4CF5-8855-FAC95DE9F141}" destId="{AE560A81-FDE0-4A00-8814-E59B8DD569BD}" srcOrd="2" destOrd="0" presId="urn:microsoft.com/office/officeart/2005/8/layout/hList3"/>
+    <dgm:cxn modelId="{E14CE5DB-1EB2-4053-9F8D-DF906C62449C}" type="presParOf" srcId="{07F78074-4D04-47B5-9A4A-73E9D149CFA7}" destId="{FCD564EC-0CD7-4D89-AF2E-50127DD4F3F0}" srcOrd="2" destOrd="0" presId="urn:microsoft.com/office/officeart/2005/8/layout/hList3"/>
+  </dgm:cxnLst>
+  <dgm:bg/>
+  <dgm:whole/>
+  <dgm:extLst>
+    <a:ext uri="http://schemas.microsoft.com/office/drawing/2008/diagram">
+      <dsp:dataModelExt xmlns:dsp="http://schemas.microsoft.com/office/drawing/2008/diagram" relId="rId7" minVer="http://schemas.openxmlformats.org/drawingml/2006/diagram"/>
+    </a:ext>
+  </dgm:extLst>
+</dgm:dataModel>
+</file>
+
+<file path=ppt/diagrams/drawing1.xml><?xml version="1.0" encoding="utf-8"?>
+<dsp:drawing xmlns:dgm="http://schemas.openxmlformats.org/drawingml/2006/diagram" xmlns:dsp="http://schemas.microsoft.com/office/drawing/2008/diagram" xmlns:a="http://schemas.openxmlformats.org/drawingml/2006/main">
+  <dsp:spTree>
+    <dsp:nvGrpSpPr>
+      <dsp:cNvPr id="0" name=""/>
+      <dsp:cNvGrpSpPr/>
+    </dsp:nvGrpSpPr>
+    <dsp:grpSpPr/>
+    <dsp:sp modelId="{80281D6B-4E1C-43D7-99D8-9D8AF1D3DBEF}">
+      <dsp:nvSpPr>
+        <dsp:cNvPr id="0" name=""/>
+        <dsp:cNvSpPr/>
+      </dsp:nvSpPr>
+      <dsp:spPr>
+        <a:xfrm>
+          <a:off x="0" y="0"/>
+          <a:ext cx="7848600" cy="1219200"/>
+        </a:xfrm>
+        <a:prstGeom prst="rect">
+          <a:avLst/>
+        </a:prstGeom>
+        <a:solidFill>
+          <a:schemeClr val="accent1">
+            <a:shade val="90000"/>
+            <a:hueOff val="0"/>
+            <a:satOff val="0"/>
+            <a:lumOff val="0"/>
+            <a:alphaOff val="0"/>
+          </a:schemeClr>
+        </a:solidFill>
+        <a:ln>
+          <a:noFill/>
+        </a:ln>
+        <a:effectLst>
+          <a:outerShdw blurRad="40000" dist="23000" dir="5400000" rotWithShape="0">
+            <a:srgbClr val="000000">
+              <a:alpha val="35000"/>
+            </a:srgbClr>
+          </a:outerShdw>
+        </a:effectLst>
+        <a:scene3d>
+          <a:camera prst="orthographicFront">
+            <a:rot lat="0" lon="0" rev="0"/>
+          </a:camera>
+          <a:lightRig rig="threePt" dir="t">
+            <a:rot lat="0" lon="0" rev="1200000"/>
+          </a:lightRig>
+        </a:scene3d>
+        <a:sp3d>
+          <a:bevelT w="63500" h="25400"/>
+        </a:sp3d>
+      </dsp:spPr>
+      <dsp:style>
+        <a:lnRef idx="0">
+          <a:scrgbClr r="0" g="0" b="0"/>
+        </a:lnRef>
+        <a:fillRef idx="1">
+          <a:scrgbClr r="0" g="0" b="0"/>
+        </a:fillRef>
+        <a:effectRef idx="3">
+          <a:scrgbClr r="0" g="0" b="0"/>
+        </a:effectRef>
+        <a:fontRef idx="minor"/>
+      </dsp:style>
+      <dsp:txBody>
+        <a:bodyPr spcFirstLastPara="0" vert="horz" wrap="square" lIns="209550" tIns="209550" rIns="209550" bIns="209550" numCol="1" spcCol="1270" anchor="ctr" anchorCtr="0">
+          <a:noAutofit/>
+        </a:bodyPr>
+        <a:lstStyle/>
+        <a:p>
+          <a:pPr lvl="0" algn="ctr" defTabSz="2444750">
+            <a:lnSpc>
+              <a:spcPct val="90000"/>
+            </a:lnSpc>
+            <a:spcBef>
+              <a:spcPct val="0"/>
+            </a:spcBef>
+            <a:spcAft>
+              <a:spcPct val="35000"/>
+            </a:spcAft>
+          </a:pPr>
+          <a:r>
+            <a:rPr lang="en-US" sz="5500" kern="1200" dirty="0" smtClean="0"/>
+            <a:t>Reality Check: Hard Limits</a:t>
+          </a:r>
+          <a:endParaRPr lang="en-US" sz="5500" kern="1200" dirty="0"/>
+        </a:p>
+      </dsp:txBody>
+      <dsp:txXfrm>
+        <a:off x="0" y="0"/>
+        <a:ext cx="7848600" cy="1219200"/>
+      </dsp:txXfrm>
+    </dsp:sp>
+    <dsp:sp modelId="{8A58F5C7-FF6B-4E4A-B29F-D6A72C33BE24}">
+      <dsp:nvSpPr>
+        <dsp:cNvPr id="0" name=""/>
+        <dsp:cNvSpPr/>
+      </dsp:nvSpPr>
+      <dsp:spPr>
+        <a:xfrm>
+          <a:off x="3832" y="1219200"/>
+          <a:ext cx="2613645" cy="2560320"/>
+        </a:xfrm>
+        <a:prstGeom prst="rect">
+          <a:avLst/>
+        </a:prstGeom>
+        <a:gradFill rotWithShape="0">
+          <a:gsLst>
+            <a:gs pos="0">
+              <a:schemeClr val="accent1">
+                <a:alpha val="90000"/>
+                <a:hueOff val="0"/>
+                <a:satOff val="0"/>
+                <a:lumOff val="0"/>
+                <a:alphaOff val="0"/>
+                <a:shade val="51000"/>
+                <a:satMod val="130000"/>
+              </a:schemeClr>
+            </a:gs>
+            <a:gs pos="80000">
+              <a:schemeClr val="accent1">
+                <a:alpha val="90000"/>
+                <a:hueOff val="0"/>
+                <a:satOff val="0"/>
+                <a:lumOff val="0"/>
+                <a:alphaOff val="0"/>
+                <a:shade val="93000"/>
+                <a:satMod val="130000"/>
+              </a:schemeClr>
+            </a:gs>
+            <a:gs pos="100000">
+              <a:schemeClr val="accent1">
+                <a:alpha val="90000"/>
+                <a:hueOff val="0"/>
+                <a:satOff val="0"/>
+                <a:lumOff val="0"/>
+                <a:alphaOff val="0"/>
+                <a:shade val="94000"/>
+                <a:satMod val="135000"/>
+              </a:schemeClr>
+            </a:gs>
+          </a:gsLst>
+          <a:lin ang="16200000" scaled="0"/>
+        </a:gradFill>
+        <a:ln>
+          <a:noFill/>
+        </a:ln>
+        <a:effectLst>
+          <a:outerShdw blurRad="40000" dist="23000" dir="5400000" rotWithShape="0">
+            <a:srgbClr val="000000">
+              <a:alpha val="35000"/>
+            </a:srgbClr>
+          </a:outerShdw>
+        </a:effectLst>
+        <a:scene3d>
+          <a:camera prst="orthographicFront">
+            <a:rot lat="0" lon="0" rev="0"/>
+          </a:camera>
+          <a:lightRig rig="threePt" dir="t">
+            <a:rot lat="0" lon="0" rev="1200000"/>
+          </a:lightRig>
+        </a:scene3d>
+        <a:sp3d>
+          <a:bevelT w="63500" h="25400"/>
+        </a:sp3d>
+      </dsp:spPr>
+      <dsp:style>
+        <a:lnRef idx="0">
+          <a:scrgbClr r="0" g="0" b="0"/>
+        </a:lnRef>
+        <a:fillRef idx="3">
+          <a:scrgbClr r="0" g="0" b="0"/>
+        </a:fillRef>
+        <a:effectRef idx="3">
+          <a:scrgbClr r="0" g="0" b="0"/>
+        </a:effectRef>
+        <a:fontRef idx="minor">
+          <a:schemeClr val="lt1"/>
+        </a:fontRef>
+      </dsp:style>
+      <dsp:txBody>
+        <a:bodyPr spcFirstLastPara="0" vert="horz" wrap="square" lIns="99060" tIns="99060" rIns="99060" bIns="99060" numCol="1" spcCol="1270" anchor="ctr" anchorCtr="0">
+          <a:noAutofit/>
+        </a:bodyPr>
+        <a:lstStyle/>
+        <a:p>
+          <a:pPr lvl="0" algn="ctr" defTabSz="1155700">
+            <a:lnSpc>
+              <a:spcPct val="90000"/>
+            </a:lnSpc>
+            <a:spcBef>
+              <a:spcPct val="0"/>
+            </a:spcBef>
+            <a:spcAft>
+              <a:spcPct val="35000"/>
+            </a:spcAft>
+          </a:pPr>
+          <a:r>
+            <a:rPr lang="en-US" sz="2600" u="none" kern="1200" dirty="0" smtClean="0"/>
+            <a:t>Physical Measurements</a:t>
+          </a:r>
+          <a:r>
+            <a:rPr lang="en-US" sz="2600" kern="1200" dirty="0" smtClean="0"/>
+            <a:t/>
+          </a:r>
+          <a:br>
+            <a:rPr lang="en-US" sz="2600" kern="1200" dirty="0" smtClean="0"/>
+          </a:br>
+          <a:r>
+            <a:rPr lang="en-US" sz="2600" b="1" kern="1200" dirty="0" smtClean="0"/>
+            <a:t>Heisenberg</a:t>
+          </a:r>
+        </a:p>
+        <a:p>
+          <a:pPr lvl="0" algn="ctr" defTabSz="1155700">
+            <a:lnSpc>
+              <a:spcPct val="90000"/>
+            </a:lnSpc>
+            <a:spcBef>
+              <a:spcPct val="0"/>
+            </a:spcBef>
+            <a:spcAft>
+              <a:spcPct val="35000"/>
+            </a:spcAft>
+          </a:pPr>
+          <a:endParaRPr lang="en-US" sz="2600" kern="1200" dirty="0"/>
+        </a:p>
+      </dsp:txBody>
+      <dsp:txXfrm>
+        <a:off x="3832" y="1219200"/>
+        <a:ext cx="2613645" cy="2560320"/>
+      </dsp:txXfrm>
+    </dsp:sp>
+    <dsp:sp modelId="{DFABE977-EA8A-44CD-81E4-CF31AB6A2BCC}">
+      <dsp:nvSpPr>
+        <dsp:cNvPr id="0" name=""/>
+        <dsp:cNvSpPr/>
+      </dsp:nvSpPr>
+      <dsp:spPr>
+        <a:xfrm>
+          <a:off x="2617477" y="1219200"/>
+          <a:ext cx="2613645" cy="2560320"/>
+        </a:xfrm>
+        <a:prstGeom prst="rect">
+          <a:avLst/>
+        </a:prstGeom>
+        <a:gradFill rotWithShape="0">
+          <a:gsLst>
+            <a:gs pos="0">
+              <a:schemeClr val="accent1">
+                <a:alpha val="90000"/>
+                <a:hueOff val="0"/>
+                <a:satOff val="0"/>
+                <a:lumOff val="0"/>
+                <a:alphaOff val="-20000"/>
+                <a:shade val="51000"/>
+                <a:satMod val="130000"/>
+              </a:schemeClr>
+            </a:gs>
+            <a:gs pos="80000">
+              <a:schemeClr val="accent1">
+                <a:alpha val="90000"/>
+                <a:hueOff val="0"/>
+                <a:satOff val="0"/>
+                <a:lumOff val="0"/>
+                <a:alphaOff val="-20000"/>
+                <a:shade val="93000"/>
+                <a:satMod val="130000"/>
+              </a:schemeClr>
+            </a:gs>
+            <a:gs pos="100000">
+              <a:schemeClr val="accent1">
+                <a:alpha val="90000"/>
+                <a:hueOff val="0"/>
+                <a:satOff val="0"/>
+                <a:lumOff val="0"/>
+                <a:alphaOff val="-20000"/>
+                <a:shade val="94000"/>
+                <a:satMod val="135000"/>
+              </a:schemeClr>
+            </a:gs>
+          </a:gsLst>
+          <a:lin ang="16200000" scaled="0"/>
+        </a:gradFill>
+        <a:ln>
+          <a:noFill/>
+        </a:ln>
+        <a:effectLst>
+          <a:outerShdw blurRad="40000" dist="23000" dir="5400000" rotWithShape="0">
+            <a:srgbClr val="000000">
+              <a:alpha val="35000"/>
+            </a:srgbClr>
+          </a:outerShdw>
+        </a:effectLst>
+        <a:scene3d>
+          <a:camera prst="orthographicFront">
+            <a:rot lat="0" lon="0" rev="0"/>
+          </a:camera>
+          <a:lightRig rig="threePt" dir="t">
+            <a:rot lat="0" lon="0" rev="1200000"/>
+          </a:lightRig>
+        </a:scene3d>
+        <a:sp3d>
+          <a:bevelT w="63500" h="25400"/>
+        </a:sp3d>
+      </dsp:spPr>
+      <dsp:style>
+        <a:lnRef idx="0">
+          <a:scrgbClr r="0" g="0" b="0"/>
+        </a:lnRef>
+        <a:fillRef idx="3">
+          <a:scrgbClr r="0" g="0" b="0"/>
+        </a:fillRef>
+        <a:effectRef idx="3">
+          <a:scrgbClr r="0" g="0" b="0"/>
+        </a:effectRef>
+        <a:fontRef idx="minor">
+          <a:schemeClr val="lt1"/>
+        </a:fontRef>
+      </dsp:style>
+      <dsp:txBody>
+        <a:bodyPr spcFirstLastPara="0" vert="horz" wrap="square" lIns="99060" tIns="99060" rIns="99060" bIns="99060" numCol="1" spcCol="1270" anchor="ctr" anchorCtr="0">
+          <a:noAutofit/>
+        </a:bodyPr>
+        <a:lstStyle/>
+        <a:p>
+          <a:pPr lvl="0" algn="ctr" defTabSz="1155700">
+            <a:lnSpc>
+              <a:spcPct val="90000"/>
+            </a:lnSpc>
+            <a:spcBef>
+              <a:spcPct val="0"/>
+            </a:spcBef>
+            <a:spcAft>
+              <a:spcPct val="35000"/>
+            </a:spcAft>
+          </a:pPr>
+          <a:r>
+            <a:rPr lang="en-US" sz="2600" u="none" kern="1200" dirty="0" smtClean="0"/>
+            <a:t>Physical Manipulation</a:t>
+          </a:r>
+          <a:r>
+            <a:rPr lang="en-US" sz="2600" kern="1200" dirty="0" smtClean="0"/>
+            <a:t/>
+          </a:r>
+          <a:br>
+            <a:rPr lang="en-US" sz="2600" kern="1200" dirty="0" smtClean="0"/>
+          </a:br>
+          <a:r>
+            <a:rPr lang="en-US" sz="2600" b="1" kern="1200" dirty="0" smtClean="0"/>
+            <a:t>Thermodynamics</a:t>
+          </a:r>
+        </a:p>
+        <a:p>
+          <a:pPr lvl="0" algn="ctr" defTabSz="1155700">
+            <a:lnSpc>
+              <a:spcPct val="90000"/>
+            </a:lnSpc>
+            <a:spcBef>
+              <a:spcPct val="0"/>
+            </a:spcBef>
+            <a:spcAft>
+              <a:spcPct val="35000"/>
+            </a:spcAft>
+          </a:pPr>
+          <a:endParaRPr lang="en-US" sz="2600" kern="1200" dirty="0"/>
+        </a:p>
+      </dsp:txBody>
+      <dsp:txXfrm>
+        <a:off x="2617477" y="1219200"/>
+        <a:ext cx="2613645" cy="2560320"/>
+      </dsp:txXfrm>
+    </dsp:sp>
+    <dsp:sp modelId="{AE560A81-FDE0-4A00-8814-E59B8DD569BD}">
+      <dsp:nvSpPr>
+        <dsp:cNvPr id="0" name=""/>
+        <dsp:cNvSpPr/>
+      </dsp:nvSpPr>
+      <dsp:spPr>
+        <a:xfrm>
+          <a:off x="5231122" y="1219200"/>
+          <a:ext cx="2613645" cy="2560320"/>
+        </a:xfrm>
+        <a:prstGeom prst="rect">
+          <a:avLst/>
+        </a:prstGeom>
+        <a:gradFill rotWithShape="0">
+          <a:gsLst>
+            <a:gs pos="0">
+              <a:schemeClr val="accent1">
+                <a:alpha val="90000"/>
+                <a:hueOff val="0"/>
+                <a:satOff val="0"/>
+                <a:lumOff val="0"/>
+                <a:alphaOff val="-40000"/>
+                <a:shade val="51000"/>
+                <a:satMod val="130000"/>
+              </a:schemeClr>
+            </a:gs>
+            <a:gs pos="80000">
+              <a:schemeClr val="accent1">
+                <a:alpha val="90000"/>
+                <a:hueOff val="0"/>
+                <a:satOff val="0"/>
+                <a:lumOff val="0"/>
+                <a:alphaOff val="-40000"/>
+                <a:shade val="93000"/>
+                <a:satMod val="130000"/>
+              </a:schemeClr>
+            </a:gs>
+            <a:gs pos="100000">
+              <a:schemeClr val="accent1">
+                <a:alpha val="90000"/>
+                <a:hueOff val="0"/>
+                <a:satOff val="0"/>
+                <a:lumOff val="0"/>
+                <a:alphaOff val="-40000"/>
+                <a:shade val="94000"/>
+                <a:satMod val="135000"/>
+              </a:schemeClr>
+            </a:gs>
+          </a:gsLst>
+          <a:lin ang="16200000" scaled="0"/>
+        </a:gradFill>
+        <a:ln>
+          <a:noFill/>
+        </a:ln>
+        <a:effectLst>
+          <a:outerShdw blurRad="40000" dist="23000" dir="5400000" rotWithShape="0">
+            <a:srgbClr val="000000">
+              <a:alpha val="35000"/>
+            </a:srgbClr>
+          </a:outerShdw>
+        </a:effectLst>
+        <a:scene3d>
+          <a:camera prst="orthographicFront">
+            <a:rot lat="0" lon="0" rev="0"/>
+          </a:camera>
+          <a:lightRig rig="threePt" dir="t">
+            <a:rot lat="0" lon="0" rev="1200000"/>
+          </a:lightRig>
+        </a:scene3d>
+        <a:sp3d>
+          <a:bevelT w="63500" h="25400"/>
+        </a:sp3d>
+      </dsp:spPr>
+      <dsp:style>
+        <a:lnRef idx="0">
+          <a:scrgbClr r="0" g="0" b="0"/>
+        </a:lnRef>
+        <a:fillRef idx="3">
+          <a:scrgbClr r="0" g="0" b="0"/>
+        </a:fillRef>
+        <a:effectRef idx="3">
+          <a:scrgbClr r="0" g="0" b="0"/>
+        </a:effectRef>
+        <a:fontRef idx="minor">
+          <a:schemeClr val="lt1"/>
+        </a:fontRef>
+      </dsp:style>
+      <dsp:txBody>
+        <a:bodyPr spcFirstLastPara="0" vert="horz" wrap="square" lIns="99060" tIns="99060" rIns="99060" bIns="99060" numCol="1" spcCol="1270" anchor="ctr" anchorCtr="0">
+          <a:noAutofit/>
+        </a:bodyPr>
+        <a:lstStyle/>
+        <a:p>
+          <a:pPr lvl="0" algn="ctr" defTabSz="1155700">
+            <a:lnSpc>
+              <a:spcPct val="90000"/>
+            </a:lnSpc>
+            <a:spcBef>
+              <a:spcPct val="0"/>
+            </a:spcBef>
+            <a:spcAft>
+              <a:spcPct val="35000"/>
+            </a:spcAft>
+          </a:pPr>
+          <a:r>
+            <a:rPr lang="en-US" sz="2600" u="none" kern="1200" dirty="0" smtClean="0"/>
+            <a:t>Knowledge</a:t>
+          </a:r>
+          <a:r>
+            <a:rPr lang="en-US" sz="2600" kern="1200" dirty="0" smtClean="0"/>
+            <a:t/>
+          </a:r>
+          <a:br>
+            <a:rPr lang="en-US" sz="2600" kern="1200" dirty="0" smtClean="0"/>
+          </a:br>
+          <a:r>
+            <a:rPr lang="en-US" sz="2600" b="1" kern="1200" dirty="0" smtClean="0"/>
+            <a:t>Gödel</a:t>
+          </a:r>
+          <a:r>
+            <a:rPr lang="en-US" sz="2600" kern="1200" dirty="0" smtClean="0"/>
+            <a:t> </a:t>
+          </a:r>
+          <a:r>
+            <a:rPr lang="en-US" sz="2600" b="1" kern="1200" dirty="0" smtClean="0"/>
+            <a:t>Incompleteness</a:t>
+          </a:r>
+        </a:p>
+        <a:p>
+          <a:pPr lvl="0" algn="ctr" defTabSz="1155700">
+            <a:lnSpc>
+              <a:spcPct val="90000"/>
+            </a:lnSpc>
+            <a:spcBef>
+              <a:spcPct val="0"/>
+            </a:spcBef>
+            <a:spcAft>
+              <a:spcPct val="35000"/>
+            </a:spcAft>
+          </a:pPr>
+          <a:endParaRPr lang="en-US" sz="2600" kern="1200" dirty="0"/>
+        </a:p>
+      </dsp:txBody>
+      <dsp:txXfrm>
+        <a:off x="5231122" y="1219200"/>
+        <a:ext cx="2613645" cy="2560320"/>
+      </dsp:txXfrm>
+    </dsp:sp>
+    <dsp:sp modelId="{FCD564EC-0CD7-4D89-AF2E-50127DD4F3F0}">
+      <dsp:nvSpPr>
+        <dsp:cNvPr id="0" name=""/>
+        <dsp:cNvSpPr/>
+      </dsp:nvSpPr>
+      <dsp:spPr>
+        <a:xfrm>
+          <a:off x="0" y="3779519"/>
+          <a:ext cx="7848600" cy="284480"/>
+        </a:xfrm>
+        <a:prstGeom prst="rect">
+          <a:avLst/>
+        </a:prstGeom>
+        <a:solidFill>
+          <a:schemeClr val="accent1">
+            <a:shade val="90000"/>
+            <a:hueOff val="0"/>
+            <a:satOff val="0"/>
+            <a:lumOff val="0"/>
+            <a:alphaOff val="0"/>
+          </a:schemeClr>
+        </a:solidFill>
+        <a:ln>
+          <a:noFill/>
+        </a:ln>
+        <a:effectLst>
+          <a:outerShdw blurRad="40000" dist="23000" dir="5400000" rotWithShape="0">
+            <a:srgbClr val="000000">
+              <a:alpha val="35000"/>
+            </a:srgbClr>
+          </a:outerShdw>
+        </a:effectLst>
+        <a:scene3d>
+          <a:camera prst="orthographicFront">
+            <a:rot lat="0" lon="0" rev="0"/>
+          </a:camera>
+          <a:lightRig rig="threePt" dir="t">
+            <a:rot lat="0" lon="0" rev="1200000"/>
+          </a:lightRig>
+        </a:scene3d>
+        <a:sp3d>
+          <a:bevelT w="63500" h="25400"/>
+        </a:sp3d>
+      </dsp:spPr>
+      <dsp:style>
+        <a:lnRef idx="0">
+          <a:scrgbClr r="0" g="0" b="0"/>
+        </a:lnRef>
+        <a:fillRef idx="1">
+          <a:scrgbClr r="0" g="0" b="0"/>
+        </a:fillRef>
+        <a:effectRef idx="3">
+          <a:scrgbClr r="0" g="0" b="0"/>
+        </a:effectRef>
+        <a:fontRef idx="minor"/>
+      </dsp:style>
+    </dsp:sp>
+  </dsp:spTree>
+</dsp:drawing>
+</file>
+
+<file path=ppt/diagrams/layout1.xml><?xml version="1.0" encoding="utf-8"?>
+<dgm:layoutDef xmlns:dgm="http://schemas.openxmlformats.org/drawingml/2006/diagram" xmlns:a="http://schemas.openxmlformats.org/drawingml/2006/main" uniqueId="urn:microsoft.com/office/officeart/2005/8/layout/hList3">
+  <dgm:title val=""/>
+  <dgm:desc val=""/>
+  <dgm:catLst>
+    <dgm:cat type="list" pri="19000"/>
+  </dgm:catLst>
+  <dgm:sampData>
+    <dgm:dataModel>
+      <dgm:ptLst>
+        <dgm:pt modelId="0" type="doc"/>
+        <dgm:pt modelId="1">
+          <dgm:prSet phldr="1"/>
+        </dgm:pt>
+        <dgm:pt modelId="2">
+          <dgm:prSet phldr="1"/>
+        </dgm:pt>
+        <dgm:pt modelId="3">
+          <dgm:prSet phldr="1"/>
+        </dgm:pt>
+        <dgm:pt modelId="4">
+          <dgm:prSet phldr="1"/>
+        </dgm:pt>
+      </dgm:ptLst>
+      <dgm:cxnLst>
+        <dgm:cxn modelId="5" srcId="0" destId="1" srcOrd="0" destOrd="0"/>
+        <dgm:cxn modelId="6" srcId="1" destId="2" srcOrd="0" destOrd="0"/>
+        <dgm:cxn modelId="7" srcId="1" destId="3" srcOrd="1" destOrd="0"/>
+        <dgm:cxn modelId="8" srcId="1" destId="4" srcOrd="2" destOrd="0"/>
+      </dgm:cxnLst>
+      <dgm:bg/>
+      <dgm:whole/>
+    </dgm:dataModel>
+  </dgm:sampData>
+  <dgm:styleData>
+    <dgm:dataModel>
+      <dgm:ptLst>
+        <dgm:pt modelId="0" type="doc"/>
+        <dgm:pt modelId="1"/>
+        <dgm:pt modelId="2"/>
+        <dgm:pt modelId="3"/>
+      </dgm:ptLst>
+      <dgm:cxnLst>
+        <dgm:cxn modelId="5" srcId="0" destId="1" srcOrd="0" destOrd="0"/>
+        <dgm:cxn modelId="6" srcId="1" destId="2" srcOrd="0" destOrd="0"/>
+        <dgm:cxn modelId="7" srcId="1" destId="3" srcOrd="1" destOrd="0"/>
+      </dgm:cxnLst>
+      <dgm:bg/>
+      <dgm:whole/>
+    </dgm:dataModel>
+  </dgm:styleData>
+  <dgm:clrData>
+    <dgm:dataModel>
+      <dgm:ptLst>
+        <dgm:pt modelId="0" type="doc"/>
+        <dgm:pt modelId="1"/>
+        <dgm:pt modelId="2"/>
+        <dgm:pt modelId="3"/>
+        <dgm:pt modelId="4"/>
+        <dgm:pt modelId="5"/>
+      </dgm:ptLst>
+      <dgm:cxnLst>
+        <dgm:cxn modelId="6" srcId="0" destId="1" srcOrd="0" destOrd="0"/>
+        <dgm:cxn modelId="7" srcId="1" destId="2" srcOrd="0" destOrd="0"/>
+        <dgm:cxn modelId="8" srcId="1" destId="3" srcOrd="1" destOrd="0"/>
+        <dgm:cxn modelId="9" srcId="1" destId="4" srcOrd="2" destOrd="0"/>
+        <dgm:cxn modelId="10" srcId="1" destId="5" srcOrd="3" destOrd="0"/>
+      </dgm:cxnLst>
+      <dgm:bg/>
+      <dgm:whole/>
+    </dgm:dataModel>
+  </dgm:clrData>
+  <dgm:layoutNode name="composite">
+    <dgm:varLst>
+      <dgm:chMax val="1"/>
+      <dgm:dir/>
+      <dgm:resizeHandles val="exact"/>
+    </dgm:varLst>
+    <dgm:alg type="composite"/>
+    <dgm:shape xmlns:r="http://schemas.openxmlformats.org/officeDocument/2006/relationships" r:blip="">
+      <dgm:adjLst/>
+    </dgm:shape>
+    <dgm:presOf/>
+    <dgm:constrLst>
+      <dgm:constr type="w" for="ch" forName="roof" refType="w"/>
+      <dgm:constr type="h" for="ch" forName="roof" refType="h" fact="0.3"/>
+      <dgm:constr type="primFontSz" for="ch" forName="roof" val="65"/>
+      <dgm:constr type="w" for="ch" forName="pillars" refType="w"/>
+      <dgm:constr type="h" for="ch" forName="pillars" refType="h" fact="0.63"/>
+      <dgm:constr type="t" for="ch" forName="pillars" refType="h" fact="0.3"/>
+      <dgm:constr type="primFontSz" for="des" forName="pillar1" val="65"/>
+      <dgm:constr type="primFontSz" for="des" forName="pillarX" refType="primFontSz" refFor="des" refForName="pillar1" op="equ"/>
+      <dgm:constr type="w" for="ch" forName="base" refType="w"/>
+      <dgm:constr type="h" for="ch" forName="base" refType="h" fact="0.07"/>
+      <dgm:constr type="t" for="ch" forName="base" refType="h" fact="0.93"/>
+    </dgm:constrLst>
+    <dgm:ruleLst/>
+    <dgm:forEach name="Name0" axis="ch" ptType="node" cnt="1">
+      <dgm:layoutNode name="roof" styleLbl="dkBgShp">
+        <dgm:alg type="tx"/>
+        <dgm:shape xmlns:r="http://schemas.openxmlformats.org/officeDocument/2006/relationships" type="rect" r:blip="">
+          <dgm:adjLst/>
+        </dgm:shape>
+        <dgm:presOf axis="self"/>
+        <dgm:constrLst>
+          <dgm:constr type="lMarg" refType="primFontSz" fact="0.3"/>
+          <dgm:constr type="rMarg" refType="primFontSz" fact="0.3"/>
+          <dgm:constr type="tMarg" refType="primFontSz" fact="0.3"/>
+          <dgm:constr type="bMarg" refType="primFontSz" fact="0.3"/>
+        </dgm:constrLst>
+        <dgm:ruleLst>
+          <dgm:rule type="primFontSz" val="5" fact="NaN" max="NaN"/>
+        </dgm:ruleLst>
+      </dgm:layoutNode>
+      <dgm:layoutNode name="pillars" styleLbl="node1">
+        <dgm:choose name="Name1">
+          <dgm:if name="Name2" func="var" arg="dir" op="equ" val="norm">
+            <dgm:alg type="lin">
+              <dgm:param type="linDir" val="fromL"/>
+            </dgm:alg>
+          </dgm:if>
+          <dgm:else name="Name3">
+            <dgm:alg type="lin">
+              <dgm:param type="linDir" val="fromR"/>
+            </dgm:alg>
+          </dgm:else>
+        </dgm:choose>
+        <dgm:shape xmlns:r="http://schemas.openxmlformats.org/officeDocument/2006/relationships" r:blip="">
+          <dgm:adjLst/>
+        </dgm:shape>
+        <dgm:presOf/>
+        <dgm:constrLst>
+          <dgm:constr type="w" for="ch" forName="pillar1" refType="w"/>
+          <dgm:constr type="h" for="ch" forName="pillar1" refType="h"/>
+          <dgm:constr type="w" for="ch" forName="pillarX" refType="w"/>
+          <dgm:constr type="h" for="ch" forName="pillarX" refType="h"/>
+        </dgm:constrLst>
+        <dgm:ruleLst/>
+        <dgm:layoutNode name="pillar1" styleLbl="node1">
+          <dgm:varLst>
+            <dgm:bulletEnabled val="1"/>
+          </dgm:varLst>
+          <dgm:alg type="tx"/>
+          <dgm:shape xmlns:r="http://schemas.openxmlformats.org/officeDocument/2006/relationships" type="rect" r:blip="">
+            <dgm:adjLst/>
+          </dgm:shape>
+          <dgm:presOf axis="ch desOrSelf" ptType="node node" st="1 1" cnt="1 0"/>
+          <dgm:constrLst>
+            <dgm:constr type="lMarg" refType="primFontSz" fact="0.3"/>
+            <dgm:constr type="rMarg" refType="primFontSz" fact="0.3"/>
+            <dgm:constr type="tMarg" refType="primFontSz" fact="0.3"/>
+            <dgm:constr type="bMarg" refType="primFontSz" fact="0.3"/>
+          </dgm:constrLst>
+          <dgm:ruleLst>
+            <dgm:rule type="primFontSz" val="5" fact="NaN" max="NaN"/>
+          </dgm:ruleLst>
+        </dgm:layoutNode>
+        <dgm:forEach name="Name4" axis="ch" ptType="node" st="2">
+          <dgm:layoutNode name="pillarX" styleLbl="node1">
+            <dgm:varLst>
+              <dgm:bulletEnabled val="1"/>
+            </dgm:varLst>
+            <dgm:alg type="tx"/>
+            <dgm:shape xmlns:r="http://schemas.openxmlformats.org/officeDocument/2006/relationships" type="rect" r:blip="">
+              <dgm:adjLst/>
+            </dgm:shape>
+            <dgm:presOf axis="desOrSelf" ptType="node"/>
+            <dgm:constrLst>
+              <dgm:constr type="lMarg" refType="primFontSz" fact="0.3"/>
+              <dgm:constr type="rMarg" refType="primFontSz" fact="0.3"/>
+              <dgm:constr type="tMarg" refType="primFontSz" fact="0.3"/>
+              <dgm:constr type="bMarg" refType="primFontSz" fact="0.3"/>
+            </dgm:constrLst>
+            <dgm:ruleLst>
+              <dgm:rule type="primFontSz" val="5" fact="NaN" max="NaN"/>
+            </dgm:ruleLst>
+          </dgm:layoutNode>
+        </dgm:forEach>
+      </dgm:layoutNode>
+      <dgm:layoutNode name="base" styleLbl="dkBgShp">
+        <dgm:alg type="sp"/>
+        <dgm:shape xmlns:r="http://schemas.openxmlformats.org/officeDocument/2006/relationships" type="rect" r:blip="">
+          <dgm:adjLst/>
+        </dgm:shape>
+        <dgm:presOf/>
+        <dgm:constrLst/>
+        <dgm:ruleLst/>
+      </dgm:layoutNode>
+    </dgm:forEach>
+  </dgm:layoutNode>
+</dgm:layoutDef>
+</file>
+
+<file path=ppt/diagrams/quickStyle1.xml><?xml version="1.0" encoding="utf-8"?>
+<dgm:styleDef xmlns:dgm="http://schemas.openxmlformats.org/drawingml/2006/diagram" xmlns:a="http://schemas.openxmlformats.org/drawingml/2006/main" uniqueId="urn:microsoft.com/office/officeart/2005/8/quickstyle/simple5">
+  <dgm:title val=""/>
+  <dgm:desc val=""/>
+  <dgm:catLst>
+    <dgm:cat type="simple" pri="10500"/>
+  </dgm:catLst>
+  <dgm:scene3d>
+    <a:camera prst="orthographicFront"/>
+    <a:lightRig rig="threePt" dir="t"/>
+  </dgm:scene3d>
+  <dgm:styleLbl name="node0">
+    <dgm:scene3d>
+      <a:camera prst="orthographicFront"/>
+      <a:lightRig rig="threePt" dir="t"/>
+    </dgm:scene3d>
+    <dgm:sp3d/>
+    <dgm:txPr/>
+    <dgm:style>
+      <a:lnRef idx="0">
+        <a:scrgbClr r="0" g="0" b="0"/>
+      </a:lnRef>
+      <a:fillRef idx="3">
+        <a:scrgbClr r="0" g="0" b="0"/>
+      </a:fillRef>
+      <a:effectRef idx="3">
+        <a:scrgbClr r="0" g="0" b="0"/>
+      </a:effectRef>
+      <a:fontRef idx="minor">
+        <a:schemeClr val="lt1"/>
+      </a:fontRef>
+    </dgm:style>
+  </dgm:styleLbl>
+  <dgm:styleLbl name="lnNode1">
+    <dgm:scene3d>
+      <a:camera prst="orthographicFront"/>
+      <a:lightRig rig="threePt" dir="t"/>
+    </dgm:scene3d>
+    <dgm:sp3d/>
+    <dgm:txPr/>
+    <dgm:style>
+      <a:lnRef idx="0">
+        <a:scrgbClr r="0" g="0" b="0"/>
+      </a:lnRef>
+      <a:fillRef idx="3">
+        <a:scrgbClr r="0" g="0" b="0"/>
+      </a:fillRef>
+      <a:effectRef idx="3">
+        <a:scrgbClr r="0" g="0" b="0"/>
+      </a:effectRef>
+      <a:fontRef idx="minor">
+        <a:schemeClr val="lt1"/>
+      </a:fontRef>
+    </dgm:style>
+  </dgm:styleLbl>
+  <dgm:styleLbl name="vennNode1">
+    <dgm:scene3d>
+      <a:camera prst="orthographicFront"/>
+      <a:lightRig rig="threePt" dir="t"/>
+    </dgm:scene3d>
+    <dgm:sp3d/>
+    <dgm:txPr/>
+    <dgm:style>
+      <a:lnRef idx="0">
+        <a:scrgbClr r="0" g="0" b="0"/>
+      </a:lnRef>
+      <a:fillRef idx="3">
+        <a:scrgbClr r="0" g="0" b="0"/>
+      </a:fillRef>
+      <a:effectRef idx="3">
+        <a:scrgbClr r="0" g="0" b="0"/>
+      </a:effectRef>
+      <a:fontRef idx="minor">
+        <a:schemeClr val="tx1"/>
+      </a:fontRef>
+    </dgm:style>
+  </dgm:styleLbl>
+  <dgm:styleLbl name="alignNode1">
+    <dgm:scene3d>
+      <a:camera prst="orthographicFront"/>
+      <a:lightRig rig="threePt" dir="t"/>
+    </dgm:scene3d>
+    <dgm:sp3d/>
+    <dgm:txPr/>
+    <dgm:style>
+      <a:lnRef idx="1">
+        <a:scrgbClr r="0" g="0" b="0"/>
+      </a:lnRef>
+      <a:fillRef idx="3">
+        <a:scrgbClr r="0" g="0" b="0"/>
+      </a:fillRef>
+      <a:effectRef idx="3">
+        <a:scrgbClr r="0" g="0" b="0"/>
+      </a:effectRef>
+      <a:fontRef idx="minor">
+        <a:schemeClr val="lt1"/>
+      </a:fontRef>
+    </dgm:style>
+  </dgm:styleLbl>
+  <dgm:styleLbl name="node1">
+    <dgm:scene3d>
+      <a:camera prst="orthographicFront"/>
+      <a:lightRig rig="threePt" dir="t"/>
+    </dgm:scene3d>
+    <dgm:sp3d/>
+    <dgm:txPr/>
+    <dgm:style>
+      <a:lnRef idx="0">
+        <a:scrgbClr r="0" g="0" b="0"/>
+      </a:lnRef>
+      <a:fillRef idx="3">
+        <a:scrgbClr r="0" g="0" b="0"/>
+      </a:fillRef>
+      <a:effectRef idx="3">
+        <a:scrgbClr r="0" g="0" b="0"/>
+      </a:effectRef>
+      <a:fontRef idx="minor">
+        <a:schemeClr val="lt1"/>
+      </a:fontRef>
+    </dgm:style>
+  </dgm:styleLbl>
+  <dgm:styleLbl name="node2">
+    <dgm:scene3d>
+      <a:camera prst="orthographicFront"/>
+      <a:lightRig rig="threePt" dir="t"/>
+    </dgm:scene3d>
+    <dgm:sp3d/>
+    <dgm:txPr/>
+    <dgm:style>
+      <a:lnRef idx="0">
+        <a:scrgbClr r="0" g="0" b="0"/>
+      </a:lnRef>
+      <a:fillRef idx="3">
+        <a:scrgbClr r="0" g="0" b="0"/>
+      </a:fillRef>
+      <a:effectRef idx="3">
+        <a:scrgbClr r="0" g="0" b="0"/>
+      </a:effectRef>
+      <a:fontRef idx="minor">
+        <a:schemeClr val="lt1"/>
+      </a:fontRef>
+    </dgm:style>
+  </dgm:styleLbl>
+  <dgm:styleLbl name="node3">
+    <dgm:scene3d>
+      <a:camera prst="orthographicFront"/>
+      <a:lightRig rig="threePt" dir="t"/>
+    </dgm:scene3d>
+    <dgm:sp3d/>
+    <dgm:txPr/>
+    <dgm:style>
+      <a:lnRef idx="0">
+        <a:scrgbClr r="0" g="0" b="0"/>
+      </a:lnRef>
+      <a:fillRef idx="3">
+        <a:scrgbClr r="0" g="0" b="0"/>
+      </a:fillRef>
+      <a:effectRef idx="3">
+        <a:scrgbClr r="0" g="0" b="0"/>
+      </a:effectRef>
+      <a:fontRef idx="minor">
+        <a:schemeClr val="lt1"/>
+      </a:fontRef>
+    </dgm:style>
+  </dgm:styleLbl>
+  <dgm:styleLbl name="node4">
+    <dgm:scene3d>
+      <a:camera prst="orthographicFront"/>
+      <a:lightRig rig="threePt" dir="t"/>
+    </dgm:scene3d>
+    <dgm:sp3d/>
+    <dgm:txPr/>
+    <dgm:style>
+      <a:lnRef idx="0">
+        <a:scrgbClr r="0" g="0" b="0"/>
+      </a:lnRef>
+      <a:fillRef idx="3">
+        <a:scrgbClr r="0" g="0" b="0"/>
+      </a:fillRef>
+      <a:effectRef idx="3">
+        <a:scrgbClr r="0" g="0" b="0"/>
+      </a:effectRef>
+      <a:fontRef idx="minor">
+        <a:schemeClr val="lt1"/>
+      </a:fontRef>
+    </dgm:style>
+  </dgm:styleLbl>
+  <dgm:styleLbl name="fgImgPlace1">
+    <dgm:scene3d>
+      <a:camera prst="orthographicFront"/>
+      <a:lightRig rig="threePt" dir="t"/>
+    </dgm:scene3d>
+    <dgm:sp3d/>
+    <dgm:txPr/>
+    <dgm:style>
+      <a:lnRef idx="0">
+        <a:scrgbClr r="0" g="0" b="0"/>
+      </a:lnRef>
+      <a:fillRef idx="1">
+        <a:scrgbClr r="0" g="0" b="0"/>
+      </a:fillRef>
+      <a:effectRef idx="3">
+        <a:scrgbClr r="0" g="0" b="0"/>
+      </a:effectRef>
+      <a:fontRef idx="minor"/>
+    </dgm:style>
+  </dgm:styleLbl>
+  <dgm:styleLbl name="alignImgPlace1">
+    <dgm:scene3d>
+      <a:camera prst="orthographicFront"/>
+      <a:lightRig rig="threePt" dir="t"/>
+    </dgm:scene3d>
+    <dgm:sp3d/>
+    <dgm:txPr/>
+    <dgm:style>
+      <a:lnRef idx="0">
+        <a:scrgbClr r="0" g="0" b="0"/>
+      </a:lnRef>
+      <a:fillRef idx="1">
+        <a:scrgbClr r="0" g="0" b="0"/>
+      </a:fillRef>
+      <a:effectRef idx="3">
+        <a:scrgbClr r="0" g="0" b="0"/>
+      </a:effectRef>
+      <a:fontRef idx="minor"/>
+    </dgm:style>
+  </dgm:styleLbl>
+  <dgm:styleLbl name="bgImgPlace1">
+    <dgm:scene3d>
+      <a:camera prst="orthographicFront"/>
+      <a:lightRig rig="threePt" dir="t"/>
+    </dgm:scene3d>
+    <dgm:sp3d/>
+    <dgm:txPr/>
+    <dgm:style>
+      <a:lnRef idx="0">
+        <a:scrgbClr r="0" g="0" b="0"/>
+      </a:lnRef>
+      <a:fillRef idx="1">
+        <a:scrgbClr r="0" g="0" b="0"/>
+      </a:fillRef>
+      <a:effectRef idx="3">
+        <a:scrgbClr r="0" g="0" b="0"/>
+      </a:effectRef>
+      <a:fontRef idx="minor"/>
+    </dgm:style>
+  </dgm:styleLbl>
+  <dgm:styleLbl name="sibTrans2D1">
+    <dgm:scene3d>
+      <a:camera prst="orthographicFront"/>
+      <a:lightRig rig="threePt" dir="t"/>
+    </dgm:scene3d>
+    <dgm:sp3d/>
+    <dgm:txPr/>
+    <dgm:style>
+      <a:lnRef idx="0">
+        <a:scrgbClr r="0" g="0" b="0"/>
+      </a:lnRef>
+      <a:fillRef idx="3">
+        <a:scrgbClr r="0" g="0" b="0"/>
+      </a:fillRef>
+      <a:effectRef idx="3">
+        <a:scrgbClr r="0" g="0" b="0"/>
+      </a:effectRef>
+      <a:fontRef idx="minor">
+        <a:schemeClr val="lt1"/>
+      </a:fontRef>
+    </dgm:style>
+  </dgm:styleLbl>
+  <dgm:styleLbl name="fgSibTrans2D1">
+    <dgm:scene3d>
+      <a:camera prst="orthographicFront"/>
+      <a:lightRig rig="threePt" dir="t"/>
+    </dgm:scene3d>
+    <dgm:sp3d/>
+    <dgm:txPr/>
+    <dgm:style>
+      <a:lnRef idx="0">
+        <a:scrgbClr r="0" g="0" b="0"/>
+      </a:lnRef>
+      <a:fillRef idx="3">
+        <a:scrgbClr r="0" g="0" b="0"/>
+      </a:fillRef>
+      <a:effectRef idx="3">
+        <a:scrgbClr r="0" g="0" b="0"/>
+      </a:effectRef>
+      <a:fontRef idx="minor">
+        <a:schemeClr val="lt1"/>
+      </a:fontRef>
+    </dgm:style>
+  </dgm:styleLbl>
+  <dgm:styleLbl name="bgSibTrans2D1">
+    <dgm:scene3d>
+      <a:camera prst="orthographicFront"/>
+      <a:lightRig rig="threePt" dir="t"/>
+    </dgm:scene3d>
+    <dgm:sp3d/>
+    <dgm:txPr/>
+    <dgm:style>
+      <a:lnRef idx="0">
+        <a:scrgbClr r="0" g="0" b="0"/>
+      </a:lnRef>
+      <a:fillRef idx="3">
+        <a:scrgbClr r="0" g="0" b="0"/>
+      </a:fillRef>
+      <a:effectRef idx="3">
+        <a:scrgbClr r="0" g="0" b="0"/>
+      </a:effectRef>
+      <a:fontRef idx="minor">
+        <a:schemeClr val="lt1"/>
+      </a:fontRef>
+    </dgm:style>
+  </dgm:styleLbl>
+  <dgm:styleLbl name="sibTrans1D1">
+    <dgm:scene3d>
+      <a:camera prst="orthographicFront"/>
+      <a:lightRig rig="threePt" dir="t"/>
+    </dgm:scene3d>
+    <dgm:sp3d/>
+    <dgm:txPr/>
+    <dgm:style>
+      <a:lnRef idx="1">
+        <a:scrgbClr r="0" g="0" b="0"/>
+      </a:lnRef>
+      <a:fillRef idx="0">
+        <a:scrgbClr r="0" g="0" b="0"/>
+      </a:fillRef>
+      <a:effectRef idx="0">
+        <a:scrgbClr r="0" g="0" b="0"/>
+      </a:effectRef>
+      <a:fontRef idx="minor"/>
+    </dgm:style>
+  </dgm:styleLbl>
+  <dgm:styleLbl name="callout">
+    <dgm:scene3d>
+      <a:camera prst="orthographicFront"/>
+      <a:lightRig rig="threePt" dir="t"/>
+    </dgm:scene3d>
+    <dgm:sp3d/>
+    <dgm:txPr/>
+    <dgm:style>
+      <a:lnRef idx="1">
+        <a:scrgbClr r="0" g="0" b="0"/>
+      </a:lnRef>
+      <a:fillRef idx="0">
+        <a:scrgbClr r="0" g="0" b="0"/>
+      </a:fillRef>
+      <a:effectRef idx="1">
+        <a:scrgbClr r="0" g="0" b="0"/>
+      </a:effectRef>
+      <a:fontRef idx="minor"/>
+    </dgm:style>
+  </dgm:styleLbl>
+  <dgm:styleLbl name="asst0">
+    <dgm:scene3d>
+      <a:camera prst="orthographicFront"/>
+      <a:lightRig rig="threePt" dir="t"/>
+    </dgm:scene3d>
+    <dgm:sp3d/>
+    <dgm:txPr/>
+    <dgm:style>
+      <a:lnRef idx="0">
+        <a:scrgbClr r="0" g="0" b="0"/>
+      </a:lnRef>
+      <a:fillRef idx="3">
+        <a:scrgbClr r="0" g="0" b="0"/>
+      </a:fillRef>
+      <a:effectRef idx="3">
+        <a:scrgbClr r="0" g="0" b="0"/>
+      </a:effectRef>
+      <a:fontRef idx="minor">
+        <a:schemeClr val="lt1"/>
+      </a:fontRef>
+    </dgm:style>
+  </dgm:styleLbl>
+  <dgm:styleLbl name="asst1">
+    <dgm:scene3d>
+      <a:camera prst="orthographicFront"/>
+      <a:lightRig rig="threePt" dir="t"/>
+    </dgm:scene3d>
+    <dgm:sp3d/>
+    <dgm:txPr/>
+    <dgm:style>
+      <a:lnRef idx="0">
+        <a:scrgbClr r="0" g="0" b="0"/>
+      </a:lnRef>
+      <a:fillRef idx="3">
+        <a:scrgbClr r="0" g="0" b="0"/>
+      </a:fillRef>
+      <a:effectRef idx="3">
+        <a:scrgbClr r="0" g="0" b="0"/>
+      </a:effectRef>
+      <a:fontRef idx="minor">
+        <a:schemeClr val="lt1"/>
+      </a:fontRef>
+    </dgm:style>
+  </dgm:styleLbl>
+  <dgm:styleLbl name="asst2">
+    <dgm:scene3d>
+      <a:camera prst="orthographicFront"/>
+      <a:lightRig rig="threePt" dir="t"/>
+    </dgm:scene3d>
+    <dgm:sp3d/>
+    <dgm:txPr/>
+    <dgm:style>
+      <a:lnRef idx="0">
+        <a:scrgbClr r="0" g="0" b="0"/>
+      </a:lnRef>
+      <a:fillRef idx="3">
+        <a:scrgbClr r="0" g="0" b="0"/>
+      </a:fillRef>
+      <a:effectRef idx="3">
+        <a:scrgbClr r="0" g="0" b="0"/>
+      </a:effectRef>
+      <a:fontRef idx="minor">
+        <a:schemeClr val="lt1"/>
+      </a:fontRef>
+    </dgm:style>
+  </dgm:styleLbl>
+  <dgm:styleLbl name="asst3">
+    <dgm:scene3d>
+      <a:camera prst="orthographicFront"/>
+      <a:lightRig rig="threePt" dir="t"/>
+    </dgm:scene3d>
+    <dgm:sp3d/>
+    <dgm:txPr/>
+    <dgm:style>
+      <a:lnRef idx="0">
+        <a:scrgbClr r="0" g="0" b="0"/>
+      </a:lnRef>
+      <a:fillRef idx="3">
+        <a:scrgbClr r="0" g="0" b="0"/>
+      </a:fillRef>
+      <a:effectRef idx="3">
+        <a:scrgbClr r="0" g="0" b="0"/>
+      </a:effectRef>
+      <a:fontRef idx="minor">
+        <a:schemeClr val="lt1"/>
+      </a:fontRef>
+    </dgm:style>
+  </dgm:styleLbl>
+  <dgm:styleLbl name="asst4">
+    <dgm:scene3d>
+      <a:camera prst="orthographicFront"/>
+      <a:lightRig rig="threePt" dir="t"/>
+    </dgm:scene3d>
+    <dgm:sp3d/>
+    <dgm:txPr/>
+    <dgm:style>
+      <a:lnRef idx="0">
+        <a:scrgbClr r="0" g="0" b="0"/>
+      </a:lnRef>
+      <a:fillRef idx="3">
+        <a:scrgbClr r="0" g="0" b="0"/>
+      </a:fillRef>
+      <a:effectRef idx="3">
+        <a:scrgbClr r="0" g="0" b="0"/>
+      </a:effectRef>
+      <a:fontRef idx="minor">
+        <a:schemeClr val="lt1"/>
+      </a:fontRef>
+    </dgm:style>
+  </dgm:styleLbl>
+  <dgm:styleLbl name="parChTrans2D1">
+    <dgm:scene3d>
+      <a:camera prst="orthographicFront"/>
+      <a:lightRig rig="threePt" dir="t"/>
+    </dgm:scene3d>
+    <dgm:sp3d/>
+    <dgm:txPr/>
+    <dgm:style>
+      <a:lnRef idx="0">
+        <a:scrgbClr r="0" g="0" b="0"/>
+      </a:lnRef>
+      <a:fillRef idx="3">
+        <a:scrgbClr r="0" g="0" b="0"/>
+      </a:fillRef>
+      <a:effectRef idx="3">
+        <a:scrgbClr r="0" g="0" b="0"/>
+      </a:effectRef>
+      <a:fontRef idx="minor">
+        <a:schemeClr val="lt1"/>
+      </a:fontRef>
+    </dgm:style>
+  </dgm:styleLbl>
+  <dgm:styleLbl name="parChTrans2D2">
+    <dgm:scene3d>
+      <a:camera prst="orthographicFront"/>
+      <a:lightRig rig="threePt" dir="t"/>
+    </dgm:scene3d>
+    <dgm:sp3d/>
+    <dgm:txPr/>
+    <dgm:style>
+      <a:lnRef idx="0">
+        <a:scrgbClr r="0" g="0" b="0"/>
+      </a:lnRef>
+      <a:fillRef idx="3">
+        <a:scrgbClr r="0" g="0" b="0"/>
+      </a:fillRef>
+      <a:effectRef idx="3">
+        <a:scrgbClr r="0" g="0" b="0"/>
+      </a:effectRef>
+      <a:fontRef idx="minor">
+        <a:schemeClr val="lt1"/>
+      </a:fontRef>
+    </dgm:style>
+  </dgm:styleLbl>
+  <dgm:styleLbl name="parChTrans2D3">
+    <dgm:scene3d>
+      <a:camera prst="orthographicFront"/>
+      <a:lightRig rig="threePt" dir="t"/>
+    </dgm:scene3d>
+    <dgm:sp3d/>
+    <dgm:txPr/>
+    <dgm:style>
+      <a:lnRef idx="0">
+        <a:scrgbClr r="0" g="0" b="0"/>
+      </a:lnRef>
+      <a:fillRef idx="3">
+        <a:scrgbClr r="0" g="0" b="0"/>
+      </a:fillRef>
+      <a:effectRef idx="3">
+        <a:scrgbClr r="0" g="0" b="0"/>
+      </a:effectRef>
+      <a:fontRef idx="minor">
+        <a:schemeClr val="lt1"/>
+      </a:fontRef>
+    </dgm:style>
+  </dgm:styleLbl>
+  <dgm:styleLbl name="parChTrans2D4">
+    <dgm:scene3d>
+      <a:camera prst="orthographicFront"/>
+      <a:lightRig rig="threePt" dir="t"/>
+    </dgm:scene3d>
+    <dgm:sp3d/>
+    <dgm:txPr/>
+    <dgm:style>
+      <a:lnRef idx="0">
+        <a:scrgbClr r="0" g="0" b="0"/>
+      </a:lnRef>
+      <a:fillRef idx="3">
+        <a:scrgbClr r="0" g="0" b="0"/>
+      </a:fillRef>
+      <a:effectRef idx="3">
+        <a:scrgbClr r="0" g="0" b="0"/>
+      </a:effectRef>
+      <a:fontRef idx="minor">
+        <a:schemeClr val="lt1"/>
+      </a:fontRef>
+    </dgm:style>
+  </dgm:styleLbl>
+  <dgm:styleLbl name="parChTrans1D1">
+    <dgm:scene3d>
+      <a:camera prst="orthographicFront"/>
+      <a:lightRig rig="threePt" dir="t"/>
+    </dgm:scene3d>
+    <dgm:sp3d/>
+    <dgm:txPr/>
+    <dgm:style>
+      <a:lnRef idx="2">
+        <a:scrgbClr r="0" g="0" b="0"/>
+      </a:lnRef>
+      <a:fillRef idx="0">
+        <a:scrgbClr r="0" g="0" b="0"/>
+      </a:fillRef>
+      <a:effectRef idx="0">
+        <a:scrgbClr r="0" g="0" b="0"/>
+      </a:effectRef>
+      <a:fontRef idx="minor"/>
+    </dgm:style>
+  </dgm:styleLbl>
+  <dgm:styleLbl name="parChTrans1D2">
+    <dgm:scene3d>
+      <a:camera prst="orthographicFront"/>
+      <a:lightRig rig="threePt" dir="t"/>
+    </dgm:scene3d>
+    <dgm:sp3d/>
+    <dgm:txPr/>
+    <dgm:style>
+      <a:lnRef idx="2">
+        <a:scrgbClr r="0" g="0" b="0"/>
+      </a:lnRef>
+      <a:fillRef idx="0">
+        <a:scrgbClr r="0" g="0" b="0"/>
+      </a:fillRef>
+      <a:effectRef idx="0">
+        <a:scrgbClr r="0" g="0" b="0"/>
+      </a:effectRef>
+      <a:fontRef idx="minor"/>
+    </dgm:style>
+  </dgm:styleLbl>
+  <dgm:styleLbl name="parChTrans1D3">
+    <dgm:scene3d>
+      <a:camera prst="orthographicFront"/>
+      <a:lightRig rig="threePt" dir="t"/>
+    </dgm:scene3d>
+    <dgm:sp3d/>
+    <dgm:txPr/>
+    <dgm:style>
+      <a:lnRef idx="2">
+        <a:scrgbClr r="0" g="0" b="0"/>
+      </a:lnRef>
+      <a:fillRef idx="0">
+        <a:scrgbClr r="0" g="0" b="0"/>
+      </a:fillRef>
+      <a:effectRef idx="0">
+        <a:scrgbClr r="0" g="0" b="0"/>
+      </a:effectRef>
+      <a:fontRef idx="minor"/>
+    </dgm:style>
+  </dgm:styleLbl>
+  <dgm:styleLbl name="parChTrans1D4">
+    <dgm:scene3d>
+      <a:camera prst="orthographicFront"/>
+      <a:lightRig rig="threePt" dir="t"/>
+    </dgm:scene3d>
+    <dgm:sp3d/>
+    <dgm:txPr/>
+    <dgm:style>
+      <a:lnRef idx="2">
+        <a:scrgbClr r="0" g="0" b="0"/>
+      </a:lnRef>
+      <a:fillRef idx="0">
+        <a:scrgbClr r="0" g="0" b="0"/>
+      </a:fillRef>
+      <a:effectRef idx="0">
+        <a:scrgbClr r="0" g="0" b="0"/>
+      </a:effectRef>
+      <a:fontRef idx="minor"/>
+    </dgm:style>
+  </dgm:styleLbl>
+  <dgm:styleLbl name="fgAcc1">
+    <dgm:scene3d>
+      <a:camera prst="orthographicFront"/>
+      <a:lightRig rig="threePt" dir="t"/>
+    </dgm:scene3d>
+    <dgm:sp3d/>
+    <dgm:txPr/>
+    <dgm:style>
+      <a:lnRef idx="1">
+        <a:scrgbClr r="0" g="0" b="0"/>
+      </a:lnRef>
+      <a:fillRef idx="1">
+        <a:scrgbClr r="0" g="0" b="0"/>
+      </a:fillRef>
+      <a:effectRef idx="2">
+        <a:scrgbClr r="0" g="0" b="0"/>
+      </a:effectRef>
+      <a:fontRef idx="minor"/>
+    </dgm:style>
+  </dgm:styleLbl>
+  <dgm:styleLbl name="conFgAcc1">
+    <dgm:scene3d>
+      <a:camera prst="orthographicFront"/>
+      <a:lightRig rig="threePt" dir="t"/>
+    </dgm:scene3d>
+    <dgm:sp3d/>
+    <dgm:txPr/>
+    <dgm:style>
+      <a:lnRef idx="1">
+        <a:scrgbClr r="0" g="0" b="0"/>
+      </a:lnRef>
+      <a:fillRef idx="1">
+        <a:scrgbClr r="0" g="0" b="0"/>
+      </a:fillRef>
+      <a:effectRef idx="2">
+        <a:scrgbClr r="0" g="0" b="0"/>
+      </a:effectRef>
+      <a:fontRef idx="minor"/>
+    </dgm:style>
+  </dgm:styleLbl>
+  <dgm:styleLbl name="alignAcc1">
+    <dgm:scene3d>
+      <a:camera prst="orthographicFront"/>
+      <a:lightRig rig="threePt" dir="t"/>
+    </dgm:scene3d>
+    <dgm:sp3d/>
+    <dgm:txPr/>
+    <dgm:style>
+      <a:lnRef idx="1">
+        <a:scrgbClr r="0" g="0" b="0"/>
+      </a:lnRef>
+      <a:fillRef idx="1">
+        <a:scrgbClr r="0" g="0" b="0"/>
+      </a:fillRef>
+      <a:effectRef idx="2">
+        <a:scrgbClr r="0" g="0" b="0"/>
+      </a:effectRef>
+      <a:fontRef idx="minor"/>
+    </dgm:style>
+  </dgm:styleLbl>
+  <dgm:styleLbl name="trAlignAcc1">
+    <dgm:scene3d>
+      <a:camera prst="orthographicFront"/>
+      <a:lightRig rig="threePt" dir="t"/>
+    </dgm:scene3d>
+    <dgm:sp3d/>
+    <dgm:txPr/>
+    <dgm:style>
+      <a:lnRef idx="1">
+        <a:scrgbClr r="0" g="0" b="0"/>
+      </a:lnRef>
+      <a:fillRef idx="1">
+        <a:scrgbClr r="0" g="0" b="0"/>
+      </a:fillRef>
+      <a:effectRef idx="0">
+        <a:scrgbClr r="0" g="0" b="0"/>
+      </a:effectRef>
+      <a:fontRef idx="minor"/>
+    </dgm:style>
+  </dgm:styleLbl>
+  <dgm:styleLbl name="bgAcc1">
+    <dgm:scene3d>
+      <a:camera prst="orthographicFront"/>
+      <a:lightRig rig="threePt" dir="t"/>
+    </dgm:scene3d>
+    <dgm:sp3d/>
+    <dgm:txPr/>
+    <dgm:style>
+      <a:lnRef idx="1">
+        <a:scrgbClr r="0" g="0" b="0"/>
+      </a:lnRef>
+      <a:fillRef idx="1">
+        <a:scrgbClr r="0" g="0" b="0"/>
+      </a:fillRef>
+      <a:effectRef idx="2">
+        <a:scrgbClr r="0" g="0" b="0"/>
+      </a:effectRef>
+      <a:fontRef idx="minor"/>
+    </dgm:style>
+  </dgm:styleLbl>
+  <dgm:styleLbl name="solidFgAcc1">
+    <dgm:scene3d>
+      <a:camera prst="orthographicFront"/>
+      <a:lightRig rig="threePt" dir="t"/>
+    </dgm:scene3d>
+    <dgm:sp3d/>
+    <dgm:txPr/>
+    <dgm:style>
+      <a:lnRef idx="1">
+        <a:scrgbClr r="0" g="0" b="0"/>
+      </a:lnRef>
+      <a:fillRef idx="1">
+        <a:scrgbClr r="0" g="0" b="0"/>
+      </a:fillRef>
+      <a:effectRef idx="2">
+        <a:scrgbClr r="0" g="0" b="0"/>
+      </a:effectRef>
+      <a:fontRef idx="minor"/>
+    </dgm:style>
+  </dgm:styleLbl>
+  <dgm:styleLbl name="solidAlignAcc1">
+    <dgm:scene3d>
+      <a:camera prst="orthographicFront"/>
+      <a:lightRig rig="threePt" dir="t"/>
+    </dgm:scene3d>
+    <dgm:sp3d/>
+    <dgm:txPr/>
+    <dgm:style>
+      <a:lnRef idx="1">
+        <a:scrgbClr r="0" g="0" b="0"/>
+      </a:lnRef>
+      <a:fillRef idx="1">
+        <a:scrgbClr r="0" g="0" b="0"/>
+      </a:fillRef>
+      <a:effectRef idx="3">
+        <a:scrgbClr r="0" g="0" b="0"/>
+      </a:effectRef>
+      <a:fontRef idx="minor"/>
+    </dgm:style>
+  </dgm:styleLbl>
+  <dgm:styleLbl name="solidBgAcc1">
+    <dgm:scene3d>
+      <a:camera prst="orthographicFront"/>
+      <a:lightRig rig="threePt" dir="t"/>
+    </dgm:scene3d>
+    <dgm:sp3d/>
+    <dgm:txPr/>
+    <dgm:style>
+      <a:lnRef idx="1">
+        <a:scrgbClr r="0" g="0" b="0"/>
+      </a:lnRef>
+      <a:fillRef idx="1">
+        <a:scrgbClr r="0" g="0" b="0"/>
+      </a:fillRef>
+      <a:effectRef idx="3">
+        <a:scrgbClr r="0" g="0" b="0"/>
+      </a:effectRef>
+      <a:fontRef idx="minor"/>
+    </dgm:style>
+  </dgm:styleLbl>
+  <dgm:styleLbl name="fgAccFollowNode1">
+    <dgm:scene3d>
+      <a:camera prst="orthographicFront"/>
+      <a:lightRig rig="threePt" dir="t"/>
+    </dgm:scene3d>
+    <dgm:sp3d/>
+    <dgm:txPr/>
+    <dgm:style>
+      <a:lnRef idx="1">
+        <a:scrgbClr r="0" g="0" b="0"/>
+      </a:lnRef>
+      <a:fillRef idx="1">
+        <a:scrgbClr r="0" g="0" b="0"/>
+      </a:fillRef>
+      <a:effectRef idx="2">
+        <a:scrgbClr r="0" g="0" b="0"/>
+      </a:effectRef>
+      <a:fontRef idx="minor"/>
+    </dgm:style>
+  </dgm:styleLbl>
+  <dgm:styleLbl name="alignAccFollowNode1">
+    <dgm:scene3d>
+      <a:camera prst="orthographicFront"/>
+      <a:lightRig rig="threePt" dir="t"/>
+    </dgm:scene3d>
+    <dgm:sp3d/>
+    <dgm:txPr/>
+    <dgm:style>
+      <a:lnRef idx="1">
+        <a:scrgbClr r="0" g="0" b="0"/>
+      </a:lnRef>
+      <a:fillRef idx="1">
+        <a:scrgbClr r="0" g="0" b="0"/>
+      </a:fillRef>
+      <a:effectRef idx="2">
+        <a:scrgbClr r="0" g="0" b="0"/>
+      </a:effectRef>
+      <a:fontRef idx="minor"/>
+    </dgm:style>
+  </dgm:styleLbl>
+  <dgm:styleLbl name="bgAccFollowNode1">
+    <dgm:scene3d>
+      <a:camera prst="orthographicFront"/>
+      <a:lightRig rig="threePt" dir="t"/>
+    </dgm:scene3d>
+    <dgm:sp3d/>
+    <dgm:txPr/>
+    <dgm:style>
+      <a:lnRef idx="1">
+        <a:scrgbClr r="0" g="0" b="0"/>
+      </a:lnRef>
+      <a:fillRef idx="1">
+        <a:scrgbClr r="0" g="0" b="0"/>
+      </a:fillRef>
+      <a:effectRef idx="2">
+        <a:scrgbClr r="0" g="0" b="0"/>
+      </a:effectRef>
+      <a:fontRef idx="minor"/>
+    </dgm:style>
+  </dgm:styleLbl>
+  <dgm:styleLbl name="fgAcc0">
+    <dgm:scene3d>
+      <a:camera prst="orthographicFront"/>
+      <a:lightRig rig="threePt" dir="t"/>
+    </dgm:scene3d>
+    <dgm:sp3d/>
+    <dgm:txPr/>
+    <dgm:style>
+      <a:lnRef idx="1">
+        <a:scrgbClr r="0" g="0" b="0"/>
+      </a:lnRef>
+      <a:fillRef idx="1">
+        <a:scrgbClr r="0" g="0" b="0"/>
+      </a:fillRef>
+      <a:effectRef idx="2">
+        <a:scrgbClr r="0" g="0" b="0"/>
+      </a:effectRef>
+      <a:fontRef idx="minor"/>
+    </dgm:style>
+  </dgm:styleLbl>
+  <dgm:styleLbl name="fgAcc2">
+    <dgm:scene3d>
+      <a:camera prst="orthographicFront"/>
+      <a:lightRig rig="threePt" dir="t"/>
+    </dgm:scene3d>
+    <dgm:sp3d/>
+    <dgm:txPr/>
+    <dgm:style>
+      <a:lnRef idx="1">
+        <a:scrgbClr r="0" g="0" b="0"/>
+      </a:lnRef>
+      <a:fillRef idx="1">
+        <a:scrgbClr r="0" g="0" b="0"/>
+      </a:fillRef>
+      <a:effectRef idx="2">
+        <a:scrgbClr r="0" g="0" b="0"/>
+      </a:effectRef>
+      <a:fontRef idx="minor"/>
+    </dgm:style>
+  </dgm:styleLbl>
+  <dgm:styleLbl name="fgAcc3">
+    <dgm:scene3d>
+      <a:camera prst="orthographicFront"/>
+      <a:lightRig rig="threePt" dir="t"/>
+    </dgm:scene3d>
+    <dgm:sp3d/>
+    <dgm:txPr/>
+    <dgm:style>
+      <a:lnRef idx="1">
+        <a:scrgbClr r="0" g="0" b="0"/>
+      </a:lnRef>
+      <a:fillRef idx="1">
+        <a:scrgbClr r="0" g="0" b="0"/>
+      </a:fillRef>
+      <a:effectRef idx="2">
+        <a:scrgbClr r="0" g="0" b="0"/>
+      </a:effectRef>
+      <a:fontRef idx="minor"/>
+    </dgm:style>
+  </dgm:styleLbl>
+  <dgm:styleLbl name="fgAcc4">
+    <dgm:scene3d>
+      <a:camera prst="orthographicFront"/>
+      <a:lightRig rig="threePt" dir="t"/>
+    </dgm:scene3d>
+    <dgm:sp3d/>
+    <dgm:txPr/>
+    <dgm:style>
+      <a:lnRef idx="1">
+        <a:scrgbClr r="0" g="0" b="0"/>
+      </a:lnRef>
+      <a:fillRef idx="1">
+        <a:scrgbClr r="0" g="0" b="0"/>
+      </a:fillRef>
+      <a:effectRef idx="2">
+        <a:scrgbClr r="0" g="0" b="0"/>
+      </a:effectRef>
+      <a:fontRef idx="minor"/>
+    </dgm:style>
+  </dgm:styleLbl>
+  <dgm:styleLbl name="bgShp">
+    <dgm:scene3d>
+      <a:camera prst="orthographicFront"/>
+      <a:lightRig rig="threePt" dir="t"/>
+    </dgm:scene3d>
+    <dgm:sp3d/>
+    <dgm:txPr/>
+    <dgm:style>
+      <a:lnRef idx="0">
+        <a:scrgbClr r="0" g="0" b="0"/>
+      </a:lnRef>
+      <a:fillRef idx="1">
+        <a:scrgbClr r="0" g="0" b="0"/>
+      </a:fillRef>
+      <a:effectRef idx="2">
+        <a:scrgbClr r="0" g="0" b="0"/>
+      </a:effectRef>
+      <a:fontRef idx="minor"/>
+    </dgm:style>
+  </dgm:styleLbl>
+  <dgm:styleLbl name="dkBgShp">
+    <dgm:scene3d>
+      <a:camera prst="orthographicFront"/>
+      <a:lightRig rig="threePt" dir="t"/>
+    </dgm:scene3d>
+    <dgm:sp3d/>
+    <dgm:txPr/>
+    <dgm:style>
+      <a:lnRef idx="0">
+        <a:scrgbClr r="0" g="0" b="0"/>
+      </a:lnRef>
+      <a:fillRef idx="1">
+        <a:scrgbClr r="0" g="0" b="0"/>
+      </a:fillRef>
+      <a:effectRef idx="3">
+        <a:scrgbClr r="0" g="0" b="0"/>
+      </a:effectRef>
+      <a:fontRef idx="minor"/>
+    </dgm:style>
+  </dgm:styleLbl>
+  <dgm:styleLbl name="trBgShp">
+    <dgm:scene3d>
+      <a:camera prst="orthographicFront"/>
+      <a:lightRig rig="threePt" dir="t"/>
+    </dgm:scene3d>
+    <dgm:sp3d/>
+    <dgm:txPr/>
+    <dgm:style>
+      <a:lnRef idx="0">
+        <a:scrgbClr r="0" g="0" b="0"/>
+      </a:lnRef>
+      <a:fillRef idx="1">
+        <a:scrgbClr r="0" g="0" b="0"/>
+      </a:fillRef>
+      <a:effectRef idx="0">
+        <a:scrgbClr r="0" g="0" b="0"/>
+      </a:effectRef>
+      <a:fontRef idx="minor"/>
+    </dgm:style>
+  </dgm:styleLbl>
+  <dgm:styleLbl name="fgShp">
+    <dgm:scene3d>
+      <a:camera prst="orthographicFront"/>
+      <a:lightRig rig="threePt" dir="t"/>
+    </dgm:scene3d>
+    <dgm:sp3d/>
+    <dgm:txPr/>
+    <dgm:style>
+      <a:lnRef idx="0">
+        <a:scrgbClr r="0" g="0" b="0"/>
+      </a:lnRef>
+      <a:fillRef idx="3">
+        <a:scrgbClr r="0" g="0" b="0"/>
+      </a:fillRef>
+      <a:effectRef idx="3">
+        <a:scrgbClr r="0" g="0" b="0"/>
+      </a:effectRef>
+      <a:fontRef idx="minor"/>
+    </dgm:style>
+  </dgm:styleLbl>
+  <dgm:styleLbl name="revTx">
+    <dgm:scene3d>
+      <a:camera prst="orthographicFront"/>
+      <a:lightRig rig="threePt" dir="t"/>
+    </dgm:scene3d>
+    <dgm:sp3d/>
+    <dgm:txPr/>
+    <dgm:style>
+      <a:lnRef idx="0">
+        <a:scrgbClr r="0" g="0" b="0"/>
+      </a:lnRef>
+      <a:fillRef idx="0">
+        <a:scrgbClr r="0" g="0" b="0"/>
+      </a:fillRef>
+      <a:effectRef idx="0">
+        <a:scrgbClr r="0" g="0" b="0"/>
+      </a:effectRef>
+      <a:fontRef idx="minor"/>
+    </dgm:style>
+  </dgm:styleLbl>
+</dgm:styleDef>
+</file>
+
 <file path=ppt/handoutMasters/handoutMaster1.xml><?xml version="1.0" encoding="utf-8"?>
 <p:handoutMaster xmlns:a="http://schemas.openxmlformats.org/drawingml/2006/main" xmlns:r="http://schemas.openxmlformats.org/officeDocument/2006/relationships" xmlns:p="http://schemas.openxmlformats.org/presentationml/2006/main">
   <p:cSld>
@@ -209,7 +3209,7 @@
           <a:p>
             <a:fld id="{9FC7A91B-FA18-4D2F-A2DC-C0564A1AEA35}" type="datetimeFigureOut">
               <a:rPr lang="en-US" smtClean="0"/>
-              <a:t>4/15/2013</a:t>
+              <a:t>4/16/2013</a:t>
             </a:fld>
             <a:endParaRPr lang="en-US"/>
           </a:p>
@@ -374,7 +3374,7 @@
           <a:p>
             <a:fld id="{E4FC77D9-5DDF-4A7B-B2B8-B112B85F14F8}" type="datetimeFigureOut">
               <a:rPr lang="en-US" smtClean="0"/>
-              <a:t>4/15/2013</a:t>
+              <a:t>4/16/2013</a:t>
             </a:fld>
             <a:endParaRPr lang="en-US"/>
           </a:p>
@@ -1185,13 +4185,8 @@
           <a:p>
             <a:r>
               <a:rPr lang="en-US" baseline="0" dirty="0" smtClean="0"/>
-              <a:t>Well… let’s think about these questions a bit more.  We can classify each </a:t>
-            </a:r>
-            <a:r>
-              <a:rPr lang="en-US" baseline="0" dirty="0" smtClean="0"/>
-              <a:t>question:</a:t>
-            </a:r>
-            <a:endParaRPr lang="en-US" baseline="0" dirty="0" smtClean="0"/>
+              <a:t>Well… let’s think about these questions a bit more.  We can classify each question:</a:t>
+            </a:r>
           </a:p>
           <a:p>
             <a:r>
@@ -1255,13 +4250,8 @@
           <a:p>
             <a:r>
               <a:rPr lang="en-US" baseline="0" dirty="0" smtClean="0"/>
-              <a:t>Now, just as the hunter-gatherers made these 3 types of queries 1000s of years ago, we make the same queries today in pursuit of our own goals.  But there’s a big question: what when our models fail?  We can’t predict the position of the deer perfectly, we can’t explain what will cause the deer to move under the trap easily, and our interventions, making the noise, don’t always accomplish our intended goals, trapping the deer.  So what are we to </a:t>
-            </a:r>
-            <a:r>
-              <a:rPr lang="en-US" baseline="0" dirty="0" smtClean="0"/>
-              <a:t>do?</a:t>
-            </a:r>
-            <a:endParaRPr lang="en-US" baseline="0" dirty="0" smtClean="0"/>
+              <a:t>Now, just as the hunter-gatherers made these 3 types of queries 1000s of years ago, we make the same queries today in pursuit of our own goals.  But there’s a big question: what when our models fail?  We can’t predict the position of the deer perfectly, we can’t explain what will cause the deer to move under the trap easily, and our interventions, making the noise, don’t always accomplish our intended goals, trapping the deer.  So what are we to do?</a:t>
+            </a:r>
           </a:p>
           <a:p>
             <a:endParaRPr lang="en-US" dirty="0"/>
@@ -1407,11 +4397,7 @@
             </a:r>
             <a:r>
               <a:rPr lang="en-US" baseline="0" dirty="0" smtClean="0"/>
-              <a:t> </a:t>
-            </a:r>
-            <a:r>
-              <a:rPr lang="en-US" baseline="0" dirty="0" smtClean="0"/>
-              <a:t>provide a check on our imaginations</a:t>
+              <a:t> provide a check on our imaginations</a:t>
             </a:r>
             <a:endParaRPr lang="en-US" dirty="0"/>
           </a:p>
@@ -1743,11 +4729,7 @@
             </a:r>
             <a:r>
               <a:rPr lang="en-US" baseline="0" dirty="0" smtClean="0"/>
-              <a:t> explain &amp; intervene given the limits of our models, but with the capabilities we do have, we can deliver the most likely explanations, predictions&amp; interventions</a:t>
-            </a:r>
-            <a:r>
-              <a:rPr lang="en-US" baseline="0" dirty="0" smtClean="0"/>
-              <a:t>.</a:t>
+              <a:t> explain &amp; intervene given the limits of our models, but with the capabilities we do have, we can deliver the most likely explanations, predictions&amp; interventions.</a:t>
             </a:r>
           </a:p>
           <a:p>
@@ -2188,7 +5170,7 @@
           <a:p>
             <a:fld id="{028801C9-EEE0-44A4-83C8-307F972F4A7F}" type="datetimeFigureOut">
               <a:rPr lang="en-US" smtClean="0"/>
-              <a:t>4/15/2013</a:t>
+              <a:t>4/16/2013</a:t>
             </a:fld>
             <a:endParaRPr lang="en-US"/>
           </a:p>
@@ -2358,7 +5340,7 @@
           <a:p>
             <a:fld id="{028801C9-EEE0-44A4-83C8-307F972F4A7F}" type="datetimeFigureOut">
               <a:rPr lang="en-US" smtClean="0"/>
-              <a:t>4/15/2013</a:t>
+              <a:t>4/16/2013</a:t>
             </a:fld>
             <a:endParaRPr lang="en-US"/>
           </a:p>
@@ -2538,7 +5520,7 @@
           <a:p>
             <a:fld id="{028801C9-EEE0-44A4-83C8-307F972F4A7F}" type="datetimeFigureOut">
               <a:rPr lang="en-US" smtClean="0"/>
-              <a:t>4/15/2013</a:t>
+              <a:t>4/16/2013</a:t>
             </a:fld>
             <a:endParaRPr lang="en-US"/>
           </a:p>
@@ -2708,7 +5690,7 @@
           <a:p>
             <a:fld id="{028801C9-EEE0-44A4-83C8-307F972F4A7F}" type="datetimeFigureOut">
               <a:rPr lang="en-US" smtClean="0"/>
-              <a:t>4/15/2013</a:t>
+              <a:t>4/16/2013</a:t>
             </a:fld>
             <a:endParaRPr lang="en-US"/>
           </a:p>
@@ -2954,7 +5936,7 @@
           <a:p>
             <a:fld id="{028801C9-EEE0-44A4-83C8-307F972F4A7F}" type="datetimeFigureOut">
               <a:rPr lang="en-US" smtClean="0"/>
-              <a:t>4/15/2013</a:t>
+              <a:t>4/16/2013</a:t>
             </a:fld>
             <a:endParaRPr lang="en-US"/>
           </a:p>
@@ -3242,7 +6224,7 @@
           <a:p>
             <a:fld id="{028801C9-EEE0-44A4-83C8-307F972F4A7F}" type="datetimeFigureOut">
               <a:rPr lang="en-US" smtClean="0"/>
-              <a:t>4/15/2013</a:t>
+              <a:t>4/16/2013</a:t>
             </a:fld>
             <a:endParaRPr lang="en-US"/>
           </a:p>
@@ -3664,7 +6646,7 @@
           <a:p>
             <a:fld id="{028801C9-EEE0-44A4-83C8-307F972F4A7F}" type="datetimeFigureOut">
               <a:rPr lang="en-US" smtClean="0"/>
-              <a:t>4/15/2013</a:t>
+              <a:t>4/16/2013</a:t>
             </a:fld>
             <a:endParaRPr lang="en-US"/>
           </a:p>
@@ -3782,7 +6764,7 @@
           <a:p>
             <a:fld id="{028801C9-EEE0-44A4-83C8-307F972F4A7F}" type="datetimeFigureOut">
               <a:rPr lang="en-US" smtClean="0"/>
-              <a:t>4/15/2013</a:t>
+              <a:t>4/16/2013</a:t>
             </a:fld>
             <a:endParaRPr lang="en-US"/>
           </a:p>
@@ -3877,7 +6859,7 @@
           <a:p>
             <a:fld id="{028801C9-EEE0-44A4-83C8-307F972F4A7F}" type="datetimeFigureOut">
               <a:rPr lang="en-US" smtClean="0"/>
-              <a:t>4/15/2013</a:t>
+              <a:t>4/16/2013</a:t>
             </a:fld>
             <a:endParaRPr lang="en-US"/>
           </a:p>
@@ -4154,7 +7136,7 @@
           <a:p>
             <a:fld id="{028801C9-EEE0-44A4-83C8-307F972F4A7F}" type="datetimeFigureOut">
               <a:rPr lang="en-US" smtClean="0"/>
-              <a:t>4/15/2013</a:t>
+              <a:t>4/16/2013</a:t>
             </a:fld>
             <a:endParaRPr lang="en-US"/>
           </a:p>
@@ -4407,7 +7389,7 @@
           <a:p>
             <a:fld id="{028801C9-EEE0-44A4-83C8-307F972F4A7F}" type="datetimeFigureOut">
               <a:rPr lang="en-US" smtClean="0"/>
-              <a:t>4/15/2013</a:t>
+              <a:t>4/16/2013</a:t>
             </a:fld>
             <a:endParaRPr lang="en-US"/>
           </a:p>
@@ -4620,7 +7602,7 @@
           <a:p>
             <a:fld id="{028801C9-EEE0-44A4-83C8-307F972F4A7F}" type="datetimeFigureOut">
               <a:rPr lang="en-US" smtClean="0"/>
-              <a:t>4/15/2013</a:t>
+              <a:t>4/16/2013</a:t>
             </a:fld>
             <a:endParaRPr lang="en-US"/>
           </a:p>
@@ -6475,13 +9457,8 @@
           <a:p>
             <a:r>
               <a:rPr lang="en-US" dirty="0" smtClean="0"/>
-              <a:t>Push bandwidth (I/O</a:t>
-            </a:r>
-            <a:r>
-              <a:rPr lang="en-US" dirty="0" smtClean="0"/>
-              <a:t>)</a:t>
-            </a:r>
-            <a:endParaRPr lang="en-US" dirty="0" smtClean="0"/>
+              <a:t>Push bandwidth (I/O)</a:t>
+            </a:r>
           </a:p>
           <a:p>
             <a:pPr lvl="1"/>
@@ -9751,11 +12728,7 @@
             <a:p>
               <a:r>
                 <a:rPr lang="en-US" sz="2400" dirty="0" smtClean="0"/>
-                <a:t>∞ </a:t>
-              </a:r>
-              <a:r>
-                <a:rPr lang="en-US" sz="2400" dirty="0" smtClean="0"/>
-                <a:t>processing</a:t>
+                <a:t>∞ processing</a:t>
               </a:r>
             </a:p>
             <a:p>
@@ -9863,19 +12836,7 @@
               <a:rPr lang="en-US" sz="2400" b="1" dirty="0" smtClean="0">
                 <a:sym typeface="Wingdings" pitchFamily="2" charset="2"/>
               </a:rPr>
-              <a:t>Can we reach the </a:t>
-            </a:r>
-            <a:r>
-              <a:rPr lang="en-US" sz="2400" b="1" dirty="0" smtClean="0">
-                <a:sym typeface="Wingdings" pitchFamily="2" charset="2"/>
-              </a:rPr>
-              <a:t>God </a:t>
-            </a:r>
-            <a:r>
-              <a:rPr lang="en-US" sz="2400" b="1" dirty="0" smtClean="0">
-                <a:sym typeface="Wingdings" pitchFamily="2" charset="2"/>
-              </a:rPr>
-              <a:t>Machine?</a:t>
+              <a:t>Can we reach the God Machine?</a:t>
             </a:r>
             <a:endParaRPr lang="en-US" sz="2400" b="1" dirty="0"/>
           </a:p>
@@ -10958,10 +13919,6 @@
           <a:bodyPr/>
           <a:lstStyle/>
           <a:p>
-            <a:r>
-              <a:rPr lang="en-US" dirty="0" smtClean="0"/>
-              <a:t>Reality Check: Hard Limits</a:t>
-            </a:r>
             <a:endParaRPr lang="en-US" dirty="0"/>
           </a:p>
         </p:txBody>
@@ -10979,41 +13936,20 @@
         <p:spPr/>
         <p:txBody>
           <a:bodyPr>
-            <a:normAutofit lnSpcReduction="10000"/>
+            <a:normAutofit fontScale="92500" lnSpcReduction="10000"/>
           </a:bodyPr>
           <a:lstStyle/>
           <a:p>
-            <a:r>
-              <a:rPr lang="en-US" dirty="0" smtClean="0"/>
-              <a:t>Physical uncertainty</a:t>
-            </a:r>
-            <a:r>
-              <a:rPr lang="en-US" dirty="0"/>
-              <a:t>: </a:t>
-            </a:r>
-            <a:r>
-              <a:rPr lang="en-US" dirty="0" smtClean="0"/>
-              <a:t>Heisenberg</a:t>
-            </a:r>
-          </a:p>
-          <a:p>
-            <a:pPr lvl="1"/>
-            <a:r>
-              <a:rPr lang="en-US" dirty="0" smtClean="0"/>
-              <a:t>Chaos</a:t>
-            </a:r>
+            <a:endParaRPr lang="en-US" dirty="0" smtClean="0"/>
+          </a:p>
+          <a:p>
             <a:endParaRPr lang="en-US" dirty="0"/>
           </a:p>
           <a:p>
-            <a:r>
-              <a:rPr lang="en-US" dirty="0"/>
-              <a:t>Epistemological uncertainty: </a:t>
-            </a:r>
-            <a:r>
-              <a:rPr lang="en-US" dirty="0" err="1" smtClean="0"/>
-              <a:t>Godel</a:t>
-            </a:r>
             <a:endParaRPr lang="en-US" dirty="0" smtClean="0"/>
+          </a:p>
+          <a:p>
+            <a:endParaRPr lang="en-US" dirty="0"/>
           </a:p>
           <a:p>
             <a:endParaRPr lang="en-US" dirty="0"/>
@@ -11031,7 +13967,10 @@
             </a:r>
           </a:p>
           <a:p>
-            <a:pPr lvl="1"/>
+            <a:pPr lvl="1">
+              <a:buFont typeface="Wingdings" pitchFamily="2" charset="2"/>
+              <a:buChar char="Ø"/>
+            </a:pPr>
             <a:r>
               <a:rPr lang="en-US" dirty="0" smtClean="0"/>
               <a:t>But we can get closer!</a:t>
@@ -11039,6 +13978,202 @@
           </a:p>
         </p:txBody>
       </p:sp>
+      <p:graphicFrame>
+        <p:nvGraphicFramePr>
+          <p:cNvPr id="5" name="Diagram 4"/>
+          <p:cNvGraphicFramePr/>
+          <p:nvPr>
+            <p:extLst>
+              <p:ext uri="{D42A27DB-BD31-4B8C-83A1-F6EECF244321}">
+                <p14:modId xmlns:p14="http://schemas.microsoft.com/office/powerpoint/2010/main" val="1295394046"/>
+              </p:ext>
+            </p:extLst>
+          </p:nvPr>
+        </p:nvGraphicFramePr>
+        <p:xfrm>
+          <a:off x="609600" y="304800"/>
+          <a:ext cx="7848600" cy="4064000"/>
+        </p:xfrm>
+        <a:graphic>
+          <a:graphicData uri="http://schemas.openxmlformats.org/drawingml/2006/diagram">
+            <dgm:relIds xmlns:dgm="http://schemas.openxmlformats.org/drawingml/2006/diagram" xmlns:r="http://schemas.openxmlformats.org/officeDocument/2006/relationships" r:dm="rId3" r:lo="rId4" r:qs="rId5" r:cs="rId6"/>
+          </a:graphicData>
+        </a:graphic>
+      </p:graphicFrame>
+      <p:pic>
+        <p:nvPicPr>
+          <p:cNvPr id="1030" name="Picture 6"/>
+          <p:cNvPicPr>
+            <a:picLocks noChangeAspect="1" noChangeArrowheads="1"/>
+          </p:cNvPicPr>
+          <p:nvPr/>
+        </p:nvPicPr>
+        <p:blipFill>
+          <a:blip r:embed="rId8">
+            <a:extLst>
+              <a:ext uri="{28A0092B-C50C-407E-A947-70E740481C1C}">
+                <a14:useLocalDpi xmlns:a14="http://schemas.microsoft.com/office/drawing/2010/main" val="0"/>
+              </a:ext>
+            </a:extLst>
+          </a:blip>
+          <a:srcRect/>
+          <a:stretch>
+            <a:fillRect/>
+          </a:stretch>
+        </p:blipFill>
+        <p:spPr bwMode="auto">
+          <a:xfrm>
+            <a:off x="5943600" y="3414712"/>
+            <a:ext cx="2457450" cy="333375"/>
+          </a:xfrm>
+          <a:prstGeom prst="rect">
+            <a:avLst/>
+          </a:prstGeom>
+          <a:noFill/>
+          <a:ln>
+            <a:noFill/>
+          </a:ln>
+          <a:effectLst>
+            <a:softEdge rad="31750"/>
+          </a:effectLst>
+          <a:extLst>
+            <a:ext uri="{909E8E84-426E-40DD-AFC4-6F175D3DCCD1}">
+              <a14:hiddenFill xmlns:a14="http://schemas.microsoft.com/office/drawing/2010/main">
+                <a:solidFill>
+                  <a:schemeClr val="accent1"/>
+                </a:solidFill>
+              </a14:hiddenFill>
+            </a:ext>
+            <a:ext uri="{91240B29-F687-4F45-9708-019B960494DF}">
+              <a14:hiddenLine xmlns:a14="http://schemas.microsoft.com/office/drawing/2010/main" w="9525">
+                <a:solidFill>
+                  <a:schemeClr val="tx1"/>
+                </a:solidFill>
+                <a:miter lim="800000"/>
+                <a:headEnd/>
+                <a:tailEnd/>
+              </a14:hiddenLine>
+            </a:ext>
+          </a:extLst>
+        </p:spPr>
+      </p:pic>
+      <p:pic>
+        <p:nvPicPr>
+          <p:cNvPr id="1031" name="Picture 7"/>
+          <p:cNvPicPr>
+            <a:picLocks noChangeAspect="1" noChangeArrowheads="1"/>
+          </p:cNvPicPr>
+          <p:nvPr/>
+        </p:nvPicPr>
+        <p:blipFill>
+          <a:blip r:embed="rId9">
+            <a:extLst>
+              <a:ext uri="{28A0092B-C50C-407E-A947-70E740481C1C}">
+                <a14:useLocalDpi xmlns:a14="http://schemas.microsoft.com/office/drawing/2010/main" val="0"/>
+              </a:ext>
+            </a:extLst>
+          </a:blip>
+          <a:srcRect/>
+          <a:stretch>
+            <a:fillRect/>
+          </a:stretch>
+        </p:blipFill>
+        <p:spPr bwMode="auto">
+          <a:xfrm>
+            <a:off x="1295400" y="3214687"/>
+            <a:ext cx="1230522" cy="733424"/>
+          </a:xfrm>
+          <a:prstGeom prst="rect">
+            <a:avLst/>
+          </a:prstGeom>
+          <a:noFill/>
+          <a:ln>
+            <a:noFill/>
+          </a:ln>
+          <a:effectLst>
+            <a:softEdge rad="31750"/>
+          </a:effectLst>
+          <a:extLst>
+            <a:ext uri="{909E8E84-426E-40DD-AFC4-6F175D3DCCD1}">
+              <a14:hiddenFill xmlns:a14="http://schemas.microsoft.com/office/drawing/2010/main">
+                <a:solidFill>
+                  <a:schemeClr val="accent1"/>
+                </a:solidFill>
+              </a14:hiddenFill>
+            </a:ext>
+            <a:ext uri="{91240B29-F687-4F45-9708-019B960494DF}">
+              <a14:hiddenLine xmlns:a14="http://schemas.microsoft.com/office/drawing/2010/main" w="9525">
+                <a:solidFill>
+                  <a:schemeClr val="tx1"/>
+                </a:solidFill>
+                <a:miter lim="800000"/>
+                <a:headEnd/>
+                <a:tailEnd/>
+              </a14:hiddenLine>
+            </a:ext>
+          </a:extLst>
+        </p:spPr>
+      </p:pic>
+      <p:pic>
+        <p:nvPicPr>
+          <p:cNvPr id="1032" name="Picture 8"/>
+          <p:cNvPicPr>
+            <a:picLocks noChangeAspect="1" noChangeArrowheads="1"/>
+          </p:cNvPicPr>
+          <p:nvPr/>
+        </p:nvPicPr>
+        <p:blipFill>
+          <a:blip r:embed="rId10">
+            <a:extLst>
+              <a:ext uri="{28A0092B-C50C-407E-A947-70E740481C1C}">
+                <a14:useLocalDpi xmlns:a14="http://schemas.microsoft.com/office/drawing/2010/main" val="0"/>
+              </a:ext>
+            </a:extLst>
+          </a:blip>
+          <a:srcRect/>
+          <a:stretch>
+            <a:fillRect/>
+          </a:stretch>
+        </p:blipFill>
+        <p:spPr bwMode="auto">
+          <a:xfrm>
+            <a:off x="3967162" y="3357561"/>
+            <a:ext cx="1209675" cy="447675"/>
+          </a:xfrm>
+          <a:prstGeom prst="rect">
+            <a:avLst/>
+          </a:prstGeom>
+          <a:noFill/>
+          <a:ln>
+            <a:noFill/>
+          </a:ln>
+          <a:effectLst>
+            <a:outerShdw dist="35921" dir="2700000" algn="ctr" rotWithShape="0">
+              <a:schemeClr val="bg2"/>
+            </a:outerShdw>
+            <a:softEdge rad="31750"/>
+          </a:effectLst>
+          <a:extLst>
+            <a:ext uri="{909E8E84-426E-40DD-AFC4-6F175D3DCCD1}">
+              <a14:hiddenFill xmlns:a14="http://schemas.microsoft.com/office/drawing/2010/main">
+                <a:solidFill>
+                  <a:schemeClr val="accent1"/>
+                </a:solidFill>
+              </a14:hiddenFill>
+            </a:ext>
+            <a:ext uri="{91240B29-F687-4F45-9708-019B960494DF}">
+              <a14:hiddenLine xmlns:a14="http://schemas.microsoft.com/office/drawing/2010/main" w="9525">
+                <a:solidFill>
+                  <a:schemeClr val="tx1"/>
+                </a:solidFill>
+                <a:miter lim="800000"/>
+                <a:headEnd/>
+                <a:tailEnd/>
+              </a14:hiddenLine>
+            </a:ext>
+          </a:extLst>
+        </p:spPr>
+      </p:pic>
     </p:spTree>
     <p:extLst>
       <p:ext uri="{BB962C8B-B14F-4D97-AF65-F5344CB8AC3E}">
@@ -11123,17 +14258,8 @@
           <a:p>
             <a:r>
               <a:rPr lang="en-US" dirty="0" smtClean="0"/>
-              <a:t>Push </a:t>
-            </a:r>
-            <a:r>
-              <a:rPr lang="en-US" dirty="0" smtClean="0"/>
-              <a:t>bandwidth (I/O</a:t>
-            </a:r>
-            <a:r>
-              <a:rPr lang="en-US" dirty="0" smtClean="0"/>
-              <a:t>)</a:t>
-            </a:r>
-            <a:endParaRPr lang="en-US" dirty="0" smtClean="0"/>
+              <a:t>Push bandwidth (I/O)</a:t>
+            </a:r>
           </a:p>
           <a:p>
             <a:pPr lvl="1"/>
@@ -11149,32 +14275,20 @@
           <a:p>
             <a:r>
               <a:rPr lang="en-US" dirty="0" smtClean="0"/>
-              <a:t>Push </a:t>
-            </a:r>
+              <a:t>Push Memory (RAM, Storage)</a:t>
+            </a:r>
+          </a:p>
+          <a:p>
+            <a:pPr lvl="1"/>
             <a:r>
               <a:rPr lang="en-US" dirty="0" smtClean="0"/>
-              <a:t>Memory (RAM, Storage)</a:t>
-            </a:r>
-          </a:p>
-          <a:p>
-            <a:pPr lvl="1"/>
+              <a:t>Summarize and condense (Hash)</a:t>
+            </a:r>
+          </a:p>
+          <a:p>
             <a:r>
               <a:rPr lang="en-US" dirty="0" smtClean="0"/>
-              <a:t>Summarize and condense (Hash</a:t>
-            </a:r>
-            <a:r>
-              <a:rPr lang="en-US" dirty="0" smtClean="0"/>
-              <a:t>)</a:t>
-            </a:r>
-          </a:p>
-          <a:p>
-            <a:r>
-              <a:rPr lang="en-US" dirty="0" smtClean="0"/>
-              <a:t>Push </a:t>
-            </a:r>
-            <a:r>
-              <a:rPr lang="en-US" dirty="0" smtClean="0"/>
-              <a:t>Computation (Processor)</a:t>
+              <a:t>Push Computation (Processor)</a:t>
             </a:r>
           </a:p>
           <a:p>
@@ -11200,27 +14314,14 @@
               <a:rPr lang="en-US" dirty="0" smtClean="0">
                 <a:sym typeface="Wingdings" pitchFamily="2" charset="2"/>
               </a:rPr>
-              <a:t>Classical </a:t>
-            </a:r>
-            <a:r>
-              <a:rPr lang="en-US" dirty="0" smtClean="0">
-                <a:sym typeface="Wingdings" pitchFamily="2" charset="2"/>
-              </a:rPr>
-              <a:t>to Probabilistic </a:t>
-            </a:r>
-            <a:endParaRPr lang="en-US" dirty="0" smtClean="0">
-              <a:sym typeface="Wingdings" pitchFamily="2" charset="2"/>
-            </a:endParaRPr>
+              <a:t>Classical to Probabilistic </a:t>
+            </a:r>
           </a:p>
           <a:p>
             <a:pPr lvl="1"/>
             <a:r>
               <a:rPr lang="en-US" dirty="0" smtClean="0"/>
-              <a:t>Increase </a:t>
-            </a:r>
-            <a:r>
-              <a:rPr lang="en-US" dirty="0" smtClean="0"/>
-              <a:t>thinking efficiency</a:t>
+              <a:t>Increase thinking efficiency</a:t>
             </a:r>
           </a:p>
           <a:p>
@@ -11324,11 +14425,7 @@
             <a:pPr lvl="1"/>
             <a:r>
               <a:rPr lang="en-US" dirty="0" smtClean="0"/>
-              <a:t>Assumptions </a:t>
-            </a:r>
-            <a:r>
-              <a:rPr lang="en-US" dirty="0" smtClean="0"/>
-              <a:t>↘</a:t>
+              <a:t>Assumptions ↘</a:t>
             </a:r>
           </a:p>
           <a:p>
@@ -11341,16 +14438,11 @@
               <a:rPr lang="en-US" dirty="0" smtClean="0"/>
               <a:t>error</a:t>
             </a:r>
-            <a:endParaRPr lang="en-US" dirty="0" smtClean="0"/>
           </a:p>
           <a:p>
             <a:r>
               <a:rPr lang="en-US" dirty="0" smtClean="0"/>
-              <a:t>Compatibility </a:t>
-            </a:r>
-            <a:r>
-              <a:rPr lang="en-US" dirty="0" smtClean="0"/>
-              <a:t>w/ other models ↗ (Unification)</a:t>
+              <a:t>Compatibility w/ other models ↗ (Unification)</a:t>
             </a:r>
           </a:p>
           <a:p>
@@ -11362,16 +14454,11 @@
               <a:rPr lang="en-US" dirty="0" smtClean="0"/>
               <a:t>↗</a:t>
             </a:r>
-            <a:endParaRPr lang="en-US" dirty="0" smtClean="0"/>
           </a:p>
           <a:p>
             <a:r>
               <a:rPr lang="en-US" dirty="0" smtClean="0"/>
-              <a:t>Simplicity </a:t>
-            </a:r>
-            <a:r>
-              <a:rPr lang="en-US" dirty="0" smtClean="0"/>
-              <a:t>↗ (</a:t>
+              <a:t>Simplicity ↗ (</a:t>
             </a:r>
             <a:r>
               <a:rPr lang="en-US" i="1" dirty="0" smtClean="0"/>

</xml_diff>